<commit_message>
some change is added
</commit_message>
<xml_diff>
--- a/ppt/GitHub.pptx
+++ b/ppt/GitHub.pptx
@@ -7,15 +7,16 @@
   <p:sldIdLst>
     <p:sldId id="256" r:id="rId2"/>
     <p:sldId id="257" r:id="rId3"/>
-    <p:sldId id="264" r:id="rId4"/>
-    <p:sldId id="259" r:id="rId5"/>
-    <p:sldId id="258" r:id="rId6"/>
-    <p:sldId id="265" r:id="rId7"/>
-    <p:sldId id="266" r:id="rId8"/>
-    <p:sldId id="260" r:id="rId9"/>
-    <p:sldId id="262" r:id="rId10"/>
-    <p:sldId id="263" r:id="rId11"/>
-    <p:sldId id="261" r:id="rId12"/>
+    <p:sldId id="267" r:id="rId4"/>
+    <p:sldId id="264" r:id="rId5"/>
+    <p:sldId id="259" r:id="rId6"/>
+    <p:sldId id="258" r:id="rId7"/>
+    <p:sldId id="265" r:id="rId8"/>
+    <p:sldId id="266" r:id="rId9"/>
+    <p:sldId id="260" r:id="rId10"/>
+    <p:sldId id="262" r:id="rId11"/>
+    <p:sldId id="263" r:id="rId12"/>
+    <p:sldId id="261" r:id="rId13"/>
   </p:sldIdLst>
   <p:sldSz cx="12192000" cy="6858000"/>
   <p:notesSz cx="6858000" cy="9144000"/>
@@ -3368,6 +3369,1074 @@
       </p:grpSpPr>
       <p:sp>
         <p:nvSpPr>
+          <p:cNvPr id="4" name="円/楕円 3"/>
+          <p:cNvSpPr/>
+          <p:nvPr/>
+        </p:nvSpPr>
+        <p:spPr>
+          <a:xfrm>
+            <a:off x="1767562" y="968515"/>
+            <a:ext cx="9916886" cy="3787446"/>
+          </a:xfrm>
+          <a:prstGeom prst="ellipse">
+            <a:avLst/>
+          </a:prstGeom>
+          <a:solidFill>
+            <a:schemeClr val="accent4">
+              <a:lumMod val="40000"/>
+              <a:lumOff val="60000"/>
+            </a:schemeClr>
+          </a:solidFill>
+        </p:spPr>
+        <p:style>
+          <a:lnRef idx="2">
+            <a:schemeClr val="accent1">
+              <a:shade val="50000"/>
+            </a:schemeClr>
+          </a:lnRef>
+          <a:fillRef idx="1">
+            <a:schemeClr val="accent1"/>
+          </a:fillRef>
+          <a:effectRef idx="0">
+            <a:schemeClr val="accent1"/>
+          </a:effectRef>
+          <a:fontRef idx="minor">
+            <a:schemeClr val="lt1"/>
+          </a:fontRef>
+        </p:style>
+        <p:txBody>
+          <a:bodyPr rtlCol="0" anchor="ctr"/>
+          <a:lstStyle/>
+          <a:p>
+            <a:pPr algn="ctr"/>
+            <a:endParaRPr kumimoji="1" lang="ja-JP" altLang="en-US"/>
+          </a:p>
+        </p:txBody>
+      </p:sp>
+      <p:sp>
+        <p:nvSpPr>
+          <p:cNvPr id="5" name="タイトル 1"/>
+          <p:cNvSpPr txBox="1">
+            <a:spLocks/>
+          </p:cNvSpPr>
+          <p:nvPr/>
+        </p:nvSpPr>
+        <p:spPr>
+          <a:xfrm>
+            <a:off x="838200" y="365126"/>
+            <a:ext cx="7086600" cy="731606"/>
+          </a:xfrm>
+          <a:prstGeom prst="rect">
+            <a:avLst/>
+          </a:prstGeom>
+        </p:spPr>
+        <p:txBody>
+          <a:bodyPr vert="horz" lIns="91440" tIns="45720" rIns="91440" bIns="45720" rtlCol="0" anchor="ctr">
+            <a:normAutofit/>
+          </a:bodyPr>
+          <a:lstStyle>
+            <a:lvl1pPr algn="l" defTabSz="914400" rtl="0" eaLnBrk="1" latinLnBrk="0" hangingPunct="1">
+              <a:lnSpc>
+                <a:spcPct val="90000"/>
+              </a:lnSpc>
+              <a:spcBef>
+                <a:spcPct val="0"/>
+              </a:spcBef>
+              <a:buNone/>
+              <a:defRPr kumimoji="1" sz="4400" kern="1200">
+                <a:solidFill>
+                  <a:schemeClr val="tx1"/>
+                </a:solidFill>
+                <a:latin typeface="+mj-lt"/>
+                <a:ea typeface="+mj-ea"/>
+                <a:cs typeface="+mj-cs"/>
+              </a:defRPr>
+            </a:lvl1pPr>
+          </a:lstStyle>
+          <a:p>
+            <a:r>
+              <a:rPr lang="ja-JP" altLang="en-US" smtClean="0"/>
+              <a:t>一般的利用形態</a:t>
+            </a:r>
+            <a:endParaRPr lang="ja-JP" altLang="en-US" dirty="0"/>
+          </a:p>
+        </p:txBody>
+      </p:sp>
+      <p:pic>
+        <p:nvPicPr>
+          <p:cNvPr id="8" name="図 7"/>
+          <p:cNvPicPr>
+            <a:picLocks noChangeAspect="1"/>
+          </p:cNvPicPr>
+          <p:nvPr/>
+        </p:nvPicPr>
+        <p:blipFill>
+          <a:blip r:embed="rId2" cstate="print">
+            <a:extLst>
+              <a:ext uri="{28A0092B-C50C-407E-A947-70E740481C1C}">
+                <a14:useLocalDpi xmlns:a14="http://schemas.microsoft.com/office/drawing/2010/main" val="0"/>
+              </a:ext>
+            </a:extLst>
+          </a:blip>
+          <a:stretch>
+            <a:fillRect/>
+          </a:stretch>
+        </p:blipFill>
+        <p:spPr>
+          <a:xfrm>
+            <a:off x="1247702" y="5666684"/>
+            <a:ext cx="596138" cy="917136"/>
+          </a:xfrm>
+          <a:prstGeom prst="rect">
+            <a:avLst/>
+          </a:prstGeom>
+        </p:spPr>
+      </p:pic>
+      <p:sp>
+        <p:nvSpPr>
+          <p:cNvPr id="10" name="フローチャート: 複数書類 9"/>
+          <p:cNvSpPr/>
+          <p:nvPr/>
+        </p:nvSpPr>
+        <p:spPr>
+          <a:xfrm>
+            <a:off x="6150428" y="5423123"/>
+            <a:ext cx="1240972" cy="1251857"/>
+          </a:xfrm>
+          <a:prstGeom prst="flowChartMultidocument">
+            <a:avLst/>
+          </a:prstGeom>
+        </p:spPr>
+        <p:style>
+          <a:lnRef idx="2">
+            <a:schemeClr val="accent1">
+              <a:shade val="50000"/>
+            </a:schemeClr>
+          </a:lnRef>
+          <a:fillRef idx="1">
+            <a:schemeClr val="accent1"/>
+          </a:fillRef>
+          <a:effectRef idx="0">
+            <a:schemeClr val="accent1"/>
+          </a:effectRef>
+          <a:fontRef idx="minor">
+            <a:schemeClr val="lt1"/>
+          </a:fontRef>
+        </p:style>
+        <p:txBody>
+          <a:bodyPr rtlCol="0" anchor="ctr"/>
+          <a:lstStyle/>
+          <a:p>
+            <a:pPr algn="ctr"/>
+            <a:r>
+              <a:rPr kumimoji="1" lang="ja-JP" altLang="en-US" dirty="0" smtClean="0"/>
+              <a:t>ローカルリポジトリ</a:t>
+            </a:r>
+            <a:endParaRPr kumimoji="1" lang="ja-JP" altLang="en-US" dirty="0"/>
+          </a:p>
+        </p:txBody>
+      </p:sp>
+      <p:pic>
+        <p:nvPicPr>
+          <p:cNvPr id="11" name="図 10"/>
+          <p:cNvPicPr>
+            <a:picLocks noChangeAspect="1"/>
+          </p:cNvPicPr>
+          <p:nvPr/>
+        </p:nvPicPr>
+        <p:blipFill>
+          <a:blip r:embed="rId2" cstate="print">
+            <a:extLst>
+              <a:ext uri="{28A0092B-C50C-407E-A947-70E740481C1C}">
+                <a14:useLocalDpi xmlns:a14="http://schemas.microsoft.com/office/drawing/2010/main" val="0"/>
+              </a:ext>
+            </a:extLst>
+          </a:blip>
+          <a:stretch>
+            <a:fillRect/>
+          </a:stretch>
+        </p:blipFill>
+        <p:spPr>
+          <a:xfrm>
+            <a:off x="4927074" y="5590484"/>
+            <a:ext cx="596138" cy="917136"/>
+          </a:xfrm>
+          <a:prstGeom prst="rect">
+            <a:avLst/>
+          </a:prstGeom>
+        </p:spPr>
+      </p:pic>
+      <p:sp>
+        <p:nvSpPr>
+          <p:cNvPr id="12" name="フローチャート: 複数書類 11"/>
+          <p:cNvSpPr/>
+          <p:nvPr/>
+        </p:nvSpPr>
+        <p:spPr>
+          <a:xfrm>
+            <a:off x="9753599" y="5331963"/>
+            <a:ext cx="1240972" cy="1251857"/>
+          </a:xfrm>
+          <a:prstGeom prst="flowChartMultidocument">
+            <a:avLst/>
+          </a:prstGeom>
+        </p:spPr>
+        <p:style>
+          <a:lnRef idx="2">
+            <a:schemeClr val="accent1">
+              <a:shade val="50000"/>
+            </a:schemeClr>
+          </a:lnRef>
+          <a:fillRef idx="1">
+            <a:schemeClr val="accent1"/>
+          </a:fillRef>
+          <a:effectRef idx="0">
+            <a:schemeClr val="accent1"/>
+          </a:effectRef>
+          <a:fontRef idx="minor">
+            <a:schemeClr val="lt1"/>
+          </a:fontRef>
+        </p:style>
+        <p:txBody>
+          <a:bodyPr rtlCol="0" anchor="ctr"/>
+          <a:lstStyle/>
+          <a:p>
+            <a:pPr algn="ctr"/>
+            <a:r>
+              <a:rPr kumimoji="1" lang="ja-JP" altLang="en-US" dirty="0" smtClean="0"/>
+              <a:t>ローカルリポジトリ</a:t>
+            </a:r>
+            <a:endParaRPr kumimoji="1" lang="ja-JP" altLang="en-US" dirty="0"/>
+          </a:p>
+        </p:txBody>
+      </p:sp>
+      <p:pic>
+        <p:nvPicPr>
+          <p:cNvPr id="13" name="図 12"/>
+          <p:cNvPicPr>
+            <a:picLocks noChangeAspect="1"/>
+          </p:cNvPicPr>
+          <p:nvPr/>
+        </p:nvPicPr>
+        <p:blipFill>
+          <a:blip r:embed="rId2" cstate="print">
+            <a:extLst>
+              <a:ext uri="{28A0092B-C50C-407E-A947-70E740481C1C}">
+                <a14:useLocalDpi xmlns:a14="http://schemas.microsoft.com/office/drawing/2010/main" val="0"/>
+              </a:ext>
+            </a:extLst>
+          </a:blip>
+          <a:stretch>
+            <a:fillRect/>
+          </a:stretch>
+        </p:blipFill>
+        <p:spPr>
+          <a:xfrm>
+            <a:off x="8530245" y="5499324"/>
+            <a:ext cx="596138" cy="917136"/>
+          </a:xfrm>
+          <a:prstGeom prst="rect">
+            <a:avLst/>
+          </a:prstGeom>
+        </p:spPr>
+      </p:pic>
+      <p:cxnSp>
+        <p:nvCxnSpPr>
+          <p:cNvPr id="14" name="直線矢印コネクタ 13"/>
+          <p:cNvCxnSpPr/>
+          <p:nvPr/>
+        </p:nvCxnSpPr>
+        <p:spPr>
+          <a:xfrm flipV="1">
+            <a:off x="3592531" y="2505082"/>
+            <a:ext cx="2598051" cy="3014269"/>
+          </a:xfrm>
+          <a:prstGeom prst="straightConnector1">
+            <a:avLst/>
+          </a:prstGeom>
+          <a:ln>
+            <a:tailEnd type="triangle"/>
+          </a:ln>
+        </p:spPr>
+        <p:style>
+          <a:lnRef idx="1">
+            <a:schemeClr val="accent1"/>
+          </a:lnRef>
+          <a:fillRef idx="0">
+            <a:schemeClr val="accent1"/>
+          </a:fillRef>
+          <a:effectRef idx="0">
+            <a:schemeClr val="accent1"/>
+          </a:effectRef>
+          <a:fontRef idx="minor">
+            <a:schemeClr val="tx1"/>
+          </a:fontRef>
+        </p:style>
+      </p:cxnSp>
+      <p:cxnSp>
+        <p:nvCxnSpPr>
+          <p:cNvPr id="15" name="直線矢印コネクタ 14"/>
+          <p:cNvCxnSpPr/>
+          <p:nvPr/>
+        </p:nvCxnSpPr>
+        <p:spPr>
+          <a:xfrm flipH="1" flipV="1">
+            <a:off x="6823781" y="2530750"/>
+            <a:ext cx="30943" cy="3023354"/>
+          </a:xfrm>
+          <a:prstGeom prst="straightConnector1">
+            <a:avLst/>
+          </a:prstGeom>
+          <a:ln>
+            <a:tailEnd type="triangle"/>
+          </a:ln>
+        </p:spPr>
+        <p:style>
+          <a:lnRef idx="1">
+            <a:schemeClr val="accent1"/>
+          </a:lnRef>
+          <a:fillRef idx="0">
+            <a:schemeClr val="accent1"/>
+          </a:fillRef>
+          <a:effectRef idx="0">
+            <a:schemeClr val="accent1"/>
+          </a:effectRef>
+          <a:fontRef idx="minor">
+            <a:schemeClr val="tx1"/>
+          </a:fontRef>
+        </p:style>
+      </p:cxnSp>
+      <p:cxnSp>
+        <p:nvCxnSpPr>
+          <p:cNvPr id="16" name="直線矢印コネクタ 15"/>
+          <p:cNvCxnSpPr/>
+          <p:nvPr/>
+        </p:nvCxnSpPr>
+        <p:spPr>
+          <a:xfrm flipH="1" flipV="1">
+            <a:off x="7482818" y="2318088"/>
+            <a:ext cx="2572939" cy="2877071"/>
+          </a:xfrm>
+          <a:prstGeom prst="straightConnector1">
+            <a:avLst/>
+          </a:prstGeom>
+          <a:ln>
+            <a:tailEnd type="triangle"/>
+          </a:ln>
+        </p:spPr>
+        <p:style>
+          <a:lnRef idx="1">
+            <a:schemeClr val="accent1"/>
+          </a:lnRef>
+          <a:fillRef idx="0">
+            <a:schemeClr val="accent1"/>
+          </a:fillRef>
+          <a:effectRef idx="0">
+            <a:schemeClr val="accent1"/>
+          </a:effectRef>
+          <a:fontRef idx="minor">
+            <a:schemeClr val="tx1"/>
+          </a:fontRef>
+        </p:style>
+      </p:cxnSp>
+      <p:sp>
+        <p:nvSpPr>
+          <p:cNvPr id="17" name="フローチャート: 複数書類 16"/>
+          <p:cNvSpPr/>
+          <p:nvPr/>
+        </p:nvSpPr>
+        <p:spPr>
+          <a:xfrm>
+            <a:off x="6211586" y="1344383"/>
+            <a:ext cx="1240972" cy="1251857"/>
+          </a:xfrm>
+          <a:prstGeom prst="flowChartMultidocument">
+            <a:avLst/>
+          </a:prstGeom>
+        </p:spPr>
+        <p:style>
+          <a:lnRef idx="2">
+            <a:schemeClr val="accent1">
+              <a:shade val="50000"/>
+            </a:schemeClr>
+          </a:lnRef>
+          <a:fillRef idx="1">
+            <a:schemeClr val="accent1"/>
+          </a:fillRef>
+          <a:effectRef idx="0">
+            <a:schemeClr val="accent1"/>
+          </a:effectRef>
+          <a:fontRef idx="minor">
+            <a:schemeClr val="lt1"/>
+          </a:fontRef>
+        </p:style>
+        <p:txBody>
+          <a:bodyPr rtlCol="0" anchor="ctr"/>
+          <a:lstStyle/>
+          <a:p>
+            <a:pPr algn="ctr"/>
+            <a:r>
+              <a:rPr kumimoji="1" lang="ja-JP" altLang="en-US" dirty="0" smtClean="0"/>
+              <a:t>中央リポジトリ</a:t>
+            </a:r>
+            <a:endParaRPr kumimoji="1" lang="ja-JP" altLang="en-US" dirty="0"/>
+          </a:p>
+        </p:txBody>
+      </p:sp>
+      <p:cxnSp>
+        <p:nvCxnSpPr>
+          <p:cNvPr id="18" name="直線矢印コネクタ 17"/>
+          <p:cNvCxnSpPr/>
+          <p:nvPr/>
+        </p:nvCxnSpPr>
+        <p:spPr>
+          <a:xfrm flipV="1">
+            <a:off x="1719177" y="2339956"/>
+            <a:ext cx="4408599" cy="3439909"/>
+          </a:xfrm>
+          <a:prstGeom prst="straightConnector1">
+            <a:avLst/>
+          </a:prstGeom>
+          <a:ln>
+            <a:tailEnd type="triangle"/>
+          </a:ln>
+        </p:spPr>
+        <p:style>
+          <a:lnRef idx="1">
+            <a:schemeClr val="accent1"/>
+          </a:lnRef>
+          <a:fillRef idx="0">
+            <a:schemeClr val="accent1"/>
+          </a:fillRef>
+          <a:effectRef idx="0">
+            <a:schemeClr val="accent1"/>
+          </a:effectRef>
+          <a:fontRef idx="minor">
+            <a:schemeClr val="tx1"/>
+          </a:fontRef>
+        </p:style>
+      </p:cxnSp>
+      <p:cxnSp>
+        <p:nvCxnSpPr>
+          <p:cNvPr id="19" name="直線矢印コネクタ 18"/>
+          <p:cNvCxnSpPr/>
+          <p:nvPr/>
+        </p:nvCxnSpPr>
+        <p:spPr>
+          <a:xfrm flipV="1">
+            <a:off x="5266906" y="2658421"/>
+            <a:ext cx="1379313" cy="2900737"/>
+          </a:xfrm>
+          <a:prstGeom prst="straightConnector1">
+            <a:avLst/>
+          </a:prstGeom>
+          <a:ln>
+            <a:tailEnd type="triangle"/>
+          </a:ln>
+        </p:spPr>
+        <p:style>
+          <a:lnRef idx="1">
+            <a:schemeClr val="accent1"/>
+          </a:lnRef>
+          <a:fillRef idx="0">
+            <a:schemeClr val="accent1"/>
+          </a:fillRef>
+          <a:effectRef idx="0">
+            <a:schemeClr val="accent1"/>
+          </a:effectRef>
+          <a:fontRef idx="minor">
+            <a:schemeClr val="tx1"/>
+          </a:fontRef>
+        </p:style>
+      </p:cxnSp>
+      <p:cxnSp>
+        <p:nvCxnSpPr>
+          <p:cNvPr id="20" name="直線矢印コネクタ 19"/>
+          <p:cNvCxnSpPr/>
+          <p:nvPr/>
+        </p:nvCxnSpPr>
+        <p:spPr>
+          <a:xfrm flipH="1" flipV="1">
+            <a:off x="7358096" y="2351314"/>
+            <a:ext cx="1208314" cy="3354838"/>
+          </a:xfrm>
+          <a:prstGeom prst="straightConnector1">
+            <a:avLst/>
+          </a:prstGeom>
+          <a:ln>
+            <a:tailEnd type="triangle"/>
+          </a:ln>
+        </p:spPr>
+        <p:style>
+          <a:lnRef idx="1">
+            <a:schemeClr val="accent1"/>
+          </a:lnRef>
+          <a:fillRef idx="0">
+            <a:schemeClr val="accent1"/>
+          </a:fillRef>
+          <a:effectRef idx="0">
+            <a:schemeClr val="accent1"/>
+          </a:effectRef>
+          <a:fontRef idx="minor">
+            <a:schemeClr val="tx1"/>
+          </a:fontRef>
+        </p:style>
+      </p:cxnSp>
+      <p:cxnSp>
+        <p:nvCxnSpPr>
+          <p:cNvPr id="21" name="直線矢印コネクタ 20"/>
+          <p:cNvCxnSpPr/>
+          <p:nvPr/>
+        </p:nvCxnSpPr>
+        <p:spPr>
+          <a:xfrm flipV="1">
+            <a:off x="1843840" y="6034759"/>
+            <a:ext cx="529245" cy="14292"/>
+          </a:xfrm>
+          <a:prstGeom prst="straightConnector1">
+            <a:avLst/>
+          </a:prstGeom>
+          <a:ln>
+            <a:tailEnd type="triangle"/>
+          </a:ln>
+        </p:spPr>
+        <p:style>
+          <a:lnRef idx="1">
+            <a:schemeClr val="accent1"/>
+          </a:lnRef>
+          <a:fillRef idx="0">
+            <a:schemeClr val="accent1"/>
+          </a:fillRef>
+          <a:effectRef idx="0">
+            <a:schemeClr val="accent1"/>
+          </a:effectRef>
+          <a:fontRef idx="minor">
+            <a:schemeClr val="tx1"/>
+          </a:fontRef>
+        </p:style>
+      </p:cxnSp>
+      <p:cxnSp>
+        <p:nvCxnSpPr>
+          <p:cNvPr id="22" name="直線矢印コネクタ 21"/>
+          <p:cNvCxnSpPr>
+            <a:stCxn id="11" idx="3"/>
+          </p:cNvCxnSpPr>
+          <p:nvPr/>
+        </p:nvCxnSpPr>
+        <p:spPr>
+          <a:xfrm flipV="1">
+            <a:off x="5523212" y="6049051"/>
+            <a:ext cx="572788" cy="1"/>
+          </a:xfrm>
+          <a:prstGeom prst="straightConnector1">
+            <a:avLst/>
+          </a:prstGeom>
+          <a:ln>
+            <a:tailEnd type="triangle"/>
+          </a:ln>
+        </p:spPr>
+        <p:style>
+          <a:lnRef idx="1">
+            <a:schemeClr val="accent1"/>
+          </a:lnRef>
+          <a:fillRef idx="0">
+            <a:schemeClr val="accent1"/>
+          </a:fillRef>
+          <a:effectRef idx="0">
+            <a:schemeClr val="accent1"/>
+          </a:effectRef>
+          <a:fontRef idx="minor">
+            <a:schemeClr val="tx1"/>
+          </a:fontRef>
+        </p:style>
+      </p:cxnSp>
+      <p:cxnSp>
+        <p:nvCxnSpPr>
+          <p:cNvPr id="23" name="直線矢印コネクタ 22"/>
+          <p:cNvCxnSpPr>
+            <a:stCxn id="13" idx="3"/>
+          </p:cNvCxnSpPr>
+          <p:nvPr/>
+        </p:nvCxnSpPr>
+        <p:spPr>
+          <a:xfrm flipV="1">
+            <a:off x="9126383" y="5957891"/>
+            <a:ext cx="540131" cy="1"/>
+          </a:xfrm>
+          <a:prstGeom prst="straightConnector1">
+            <a:avLst/>
+          </a:prstGeom>
+          <a:ln>
+            <a:tailEnd type="triangle"/>
+          </a:ln>
+        </p:spPr>
+        <p:style>
+          <a:lnRef idx="1">
+            <a:schemeClr val="accent1"/>
+          </a:lnRef>
+          <a:fillRef idx="0">
+            <a:schemeClr val="accent1"/>
+          </a:fillRef>
+          <a:effectRef idx="0">
+            <a:schemeClr val="accent1"/>
+          </a:effectRef>
+          <a:fontRef idx="minor">
+            <a:schemeClr val="tx1"/>
+          </a:fontRef>
+        </p:style>
+      </p:cxnSp>
+      <p:sp>
+        <p:nvSpPr>
+          <p:cNvPr id="24" name="テキスト ボックス 23"/>
+          <p:cNvSpPr txBox="1"/>
+          <p:nvPr/>
+        </p:nvSpPr>
+        <p:spPr>
+          <a:xfrm>
+            <a:off x="3099624" y="4970347"/>
+            <a:ext cx="639919" cy="369332"/>
+          </a:xfrm>
+          <a:prstGeom prst="rect">
+            <a:avLst/>
+          </a:prstGeom>
+          <a:noFill/>
+        </p:spPr>
+        <p:txBody>
+          <a:bodyPr wrap="none" rtlCol="0">
+            <a:spAutoFit/>
+          </a:bodyPr>
+          <a:lstStyle/>
+          <a:p>
+            <a:r>
+              <a:rPr kumimoji="1" lang="en-US" altLang="ja-JP" dirty="0" smtClean="0"/>
+              <a:t>push</a:t>
+            </a:r>
+            <a:endParaRPr kumimoji="1" lang="ja-JP" altLang="en-US" dirty="0"/>
+          </a:p>
+        </p:txBody>
+      </p:sp>
+      <p:sp>
+        <p:nvSpPr>
+          <p:cNvPr id="25" name="テキスト ボックス 24"/>
+          <p:cNvSpPr txBox="1"/>
+          <p:nvPr/>
+        </p:nvSpPr>
+        <p:spPr>
+          <a:xfrm>
+            <a:off x="6086086" y="4846155"/>
+            <a:ext cx="639919" cy="369332"/>
+          </a:xfrm>
+          <a:prstGeom prst="rect">
+            <a:avLst/>
+          </a:prstGeom>
+          <a:noFill/>
+        </p:spPr>
+        <p:txBody>
+          <a:bodyPr wrap="none" rtlCol="0">
+            <a:spAutoFit/>
+          </a:bodyPr>
+          <a:lstStyle/>
+          <a:p>
+            <a:r>
+              <a:rPr kumimoji="1" lang="en-US" altLang="ja-JP" dirty="0" smtClean="0"/>
+              <a:t>push</a:t>
+            </a:r>
+            <a:endParaRPr kumimoji="1" lang="ja-JP" altLang="en-US" dirty="0"/>
+          </a:p>
+        </p:txBody>
+      </p:sp>
+      <p:sp>
+        <p:nvSpPr>
+          <p:cNvPr id="26" name="テキスト ボックス 25"/>
+          <p:cNvSpPr txBox="1"/>
+          <p:nvPr/>
+        </p:nvSpPr>
+        <p:spPr>
+          <a:xfrm>
+            <a:off x="9000559" y="4688549"/>
+            <a:ext cx="639919" cy="369332"/>
+          </a:xfrm>
+          <a:prstGeom prst="rect">
+            <a:avLst/>
+          </a:prstGeom>
+          <a:noFill/>
+        </p:spPr>
+        <p:txBody>
+          <a:bodyPr wrap="none" rtlCol="0">
+            <a:spAutoFit/>
+          </a:bodyPr>
+          <a:lstStyle/>
+          <a:p>
+            <a:r>
+              <a:rPr kumimoji="1" lang="en-US" altLang="ja-JP" dirty="0" smtClean="0"/>
+              <a:t>push</a:t>
+            </a:r>
+            <a:endParaRPr kumimoji="1" lang="ja-JP" altLang="en-US" dirty="0"/>
+          </a:p>
+        </p:txBody>
+      </p:sp>
+      <p:sp>
+        <p:nvSpPr>
+          <p:cNvPr id="27" name="テキスト ボックス 26"/>
+          <p:cNvSpPr txBox="1"/>
+          <p:nvPr/>
+        </p:nvSpPr>
+        <p:spPr>
+          <a:xfrm>
+            <a:off x="1801524" y="6056737"/>
+            <a:ext cx="763351" cy="307777"/>
+          </a:xfrm>
+          <a:prstGeom prst="rect">
+            <a:avLst/>
+          </a:prstGeom>
+          <a:noFill/>
+        </p:spPr>
+        <p:txBody>
+          <a:bodyPr wrap="none" rtlCol="0">
+            <a:spAutoFit/>
+          </a:bodyPr>
+          <a:lstStyle/>
+          <a:p>
+            <a:r>
+              <a:rPr kumimoji="1" lang="en-US" altLang="ja-JP" sz="1400" dirty="0" smtClean="0"/>
+              <a:t>Commit</a:t>
+            </a:r>
+            <a:endParaRPr kumimoji="1" lang="ja-JP" altLang="en-US" sz="1400" dirty="0"/>
+          </a:p>
+        </p:txBody>
+      </p:sp>
+      <p:sp>
+        <p:nvSpPr>
+          <p:cNvPr id="28" name="テキスト ボックス 27"/>
+          <p:cNvSpPr txBox="1"/>
+          <p:nvPr/>
+        </p:nvSpPr>
+        <p:spPr>
+          <a:xfrm>
+            <a:off x="5478705" y="6055533"/>
+            <a:ext cx="763351" cy="307777"/>
+          </a:xfrm>
+          <a:prstGeom prst="rect">
+            <a:avLst/>
+          </a:prstGeom>
+          <a:noFill/>
+        </p:spPr>
+        <p:txBody>
+          <a:bodyPr wrap="none" rtlCol="0">
+            <a:spAutoFit/>
+          </a:bodyPr>
+          <a:lstStyle/>
+          <a:p>
+            <a:r>
+              <a:rPr kumimoji="1" lang="en-US" altLang="ja-JP" sz="1400" dirty="0" smtClean="0"/>
+              <a:t>Commit</a:t>
+            </a:r>
+            <a:endParaRPr kumimoji="1" lang="ja-JP" altLang="en-US" sz="1400" dirty="0"/>
+          </a:p>
+        </p:txBody>
+      </p:sp>
+      <p:sp>
+        <p:nvSpPr>
+          <p:cNvPr id="29" name="テキスト ボックス 28"/>
+          <p:cNvSpPr txBox="1"/>
+          <p:nvPr/>
+        </p:nvSpPr>
+        <p:spPr>
+          <a:xfrm>
+            <a:off x="9029903" y="5850097"/>
+            <a:ext cx="733089" cy="307777"/>
+          </a:xfrm>
+          <a:prstGeom prst="rect">
+            <a:avLst/>
+          </a:prstGeom>
+          <a:noFill/>
+        </p:spPr>
+        <p:txBody>
+          <a:bodyPr wrap="square" rtlCol="0">
+            <a:spAutoFit/>
+          </a:bodyPr>
+          <a:lstStyle/>
+          <a:p>
+            <a:r>
+              <a:rPr kumimoji="1" lang="en-US" altLang="ja-JP" sz="1400" dirty="0" err="1" smtClean="0"/>
+              <a:t>Commi</a:t>
+            </a:r>
+            <a:endParaRPr kumimoji="1" lang="ja-JP" altLang="en-US" sz="1400" dirty="0"/>
+          </a:p>
+        </p:txBody>
+      </p:sp>
+      <p:sp>
+        <p:nvSpPr>
+          <p:cNvPr id="30" name="テキスト ボックス 29"/>
+          <p:cNvSpPr txBox="1"/>
+          <p:nvPr/>
+        </p:nvSpPr>
+        <p:spPr>
+          <a:xfrm>
+            <a:off x="5098823" y="4124306"/>
+            <a:ext cx="1343445" cy="369332"/>
+          </a:xfrm>
+          <a:prstGeom prst="rect">
+            <a:avLst/>
+          </a:prstGeom>
+          <a:noFill/>
+        </p:spPr>
+        <p:txBody>
+          <a:bodyPr wrap="none" rtlCol="0">
+            <a:spAutoFit/>
+          </a:bodyPr>
+          <a:lstStyle/>
+          <a:p>
+            <a:r>
+              <a:rPr kumimoji="1" lang="en-US" altLang="ja-JP" dirty="0" smtClean="0"/>
+              <a:t>Pull Request</a:t>
+            </a:r>
+            <a:endParaRPr kumimoji="1" lang="ja-JP" altLang="en-US" dirty="0"/>
+          </a:p>
+        </p:txBody>
+      </p:sp>
+      <p:sp>
+        <p:nvSpPr>
+          <p:cNvPr id="31" name="テキスト ボックス 30"/>
+          <p:cNvSpPr txBox="1"/>
+          <p:nvPr/>
+        </p:nvSpPr>
+        <p:spPr>
+          <a:xfrm>
+            <a:off x="3420089" y="3642884"/>
+            <a:ext cx="1343445" cy="369332"/>
+          </a:xfrm>
+          <a:prstGeom prst="rect">
+            <a:avLst/>
+          </a:prstGeom>
+          <a:noFill/>
+        </p:spPr>
+        <p:txBody>
+          <a:bodyPr wrap="none" rtlCol="0">
+            <a:spAutoFit/>
+          </a:bodyPr>
+          <a:lstStyle/>
+          <a:p>
+            <a:r>
+              <a:rPr kumimoji="1" lang="en-US" altLang="ja-JP" dirty="0" smtClean="0"/>
+              <a:t>Pull Request</a:t>
+            </a:r>
+            <a:endParaRPr kumimoji="1" lang="ja-JP" altLang="en-US" dirty="0"/>
+          </a:p>
+        </p:txBody>
+      </p:sp>
+      <p:sp>
+        <p:nvSpPr>
+          <p:cNvPr id="32" name="テキスト ボックス 31"/>
+          <p:cNvSpPr txBox="1"/>
+          <p:nvPr/>
+        </p:nvSpPr>
+        <p:spPr>
+          <a:xfrm>
+            <a:off x="7425842" y="3682148"/>
+            <a:ext cx="1343445" cy="369332"/>
+          </a:xfrm>
+          <a:prstGeom prst="rect">
+            <a:avLst/>
+          </a:prstGeom>
+          <a:noFill/>
+        </p:spPr>
+        <p:txBody>
+          <a:bodyPr wrap="none" rtlCol="0">
+            <a:spAutoFit/>
+          </a:bodyPr>
+          <a:lstStyle/>
+          <a:p>
+            <a:r>
+              <a:rPr kumimoji="1" lang="en-US" altLang="ja-JP" dirty="0" smtClean="0"/>
+              <a:t>Pull Request</a:t>
+            </a:r>
+            <a:endParaRPr kumimoji="1" lang="ja-JP" altLang="en-US" dirty="0"/>
+          </a:p>
+        </p:txBody>
+      </p:sp>
+      <p:sp>
+        <p:nvSpPr>
+          <p:cNvPr id="33" name="フローチャート: 複数書類 32"/>
+          <p:cNvSpPr/>
+          <p:nvPr/>
+        </p:nvSpPr>
+        <p:spPr>
+          <a:xfrm>
+            <a:off x="2471056" y="5499323"/>
+            <a:ext cx="1240972" cy="1251857"/>
+          </a:xfrm>
+          <a:prstGeom prst="flowChartMultidocument">
+            <a:avLst/>
+          </a:prstGeom>
+        </p:spPr>
+        <p:style>
+          <a:lnRef idx="2">
+            <a:schemeClr val="accent1">
+              <a:shade val="50000"/>
+            </a:schemeClr>
+          </a:lnRef>
+          <a:fillRef idx="1">
+            <a:schemeClr val="accent1"/>
+          </a:fillRef>
+          <a:effectRef idx="0">
+            <a:schemeClr val="accent1"/>
+          </a:effectRef>
+          <a:fontRef idx="minor">
+            <a:schemeClr val="lt1"/>
+          </a:fontRef>
+        </p:style>
+        <p:txBody>
+          <a:bodyPr rtlCol="0" anchor="ctr"/>
+          <a:lstStyle/>
+          <a:p>
+            <a:pPr algn="ctr"/>
+            <a:r>
+              <a:rPr kumimoji="1" lang="ja-JP" altLang="en-US" dirty="0" smtClean="0"/>
+              <a:t>ローカルリポジトリ</a:t>
+            </a:r>
+            <a:endParaRPr kumimoji="1" lang="ja-JP" altLang="en-US" dirty="0"/>
+          </a:p>
+        </p:txBody>
+      </p:sp>
+      <p:cxnSp>
+        <p:nvCxnSpPr>
+          <p:cNvPr id="34" name="直線矢印コネクタ 33"/>
+          <p:cNvCxnSpPr/>
+          <p:nvPr/>
+        </p:nvCxnSpPr>
+        <p:spPr>
+          <a:xfrm flipV="1">
+            <a:off x="5419306" y="4631472"/>
+            <a:ext cx="1412766" cy="1080087"/>
+          </a:xfrm>
+          <a:prstGeom prst="straightConnector1">
+            <a:avLst/>
+          </a:prstGeom>
+          <a:ln>
+            <a:tailEnd type="triangle"/>
+          </a:ln>
+        </p:spPr>
+        <p:style>
+          <a:lnRef idx="1">
+            <a:schemeClr val="accent1"/>
+          </a:lnRef>
+          <a:fillRef idx="0">
+            <a:schemeClr val="accent1"/>
+          </a:fillRef>
+          <a:effectRef idx="0">
+            <a:schemeClr val="accent1"/>
+          </a:effectRef>
+          <a:fontRef idx="minor">
+            <a:schemeClr val="tx1"/>
+          </a:fontRef>
+        </p:style>
+      </p:cxnSp>
+      <p:cxnSp>
+        <p:nvCxnSpPr>
+          <p:cNvPr id="35" name="直線矢印コネクタ 34"/>
+          <p:cNvCxnSpPr/>
+          <p:nvPr/>
+        </p:nvCxnSpPr>
+        <p:spPr>
+          <a:xfrm flipV="1">
+            <a:off x="8953491" y="4688549"/>
+            <a:ext cx="591055" cy="696134"/>
+          </a:xfrm>
+          <a:prstGeom prst="straightConnector1">
+            <a:avLst/>
+          </a:prstGeom>
+          <a:ln>
+            <a:tailEnd type="triangle"/>
+          </a:ln>
+        </p:spPr>
+        <p:style>
+          <a:lnRef idx="1">
+            <a:schemeClr val="accent1"/>
+          </a:lnRef>
+          <a:fillRef idx="0">
+            <a:schemeClr val="accent1"/>
+          </a:fillRef>
+          <a:effectRef idx="0">
+            <a:schemeClr val="accent1"/>
+          </a:effectRef>
+          <a:fontRef idx="minor">
+            <a:schemeClr val="tx1"/>
+          </a:fontRef>
+        </p:style>
+      </p:cxnSp>
+      <p:cxnSp>
+        <p:nvCxnSpPr>
+          <p:cNvPr id="36" name="直線矢印コネクタ 35"/>
+          <p:cNvCxnSpPr/>
+          <p:nvPr/>
+        </p:nvCxnSpPr>
+        <p:spPr>
+          <a:xfrm flipV="1">
+            <a:off x="1781720" y="5093216"/>
+            <a:ext cx="2202461" cy="713991"/>
+          </a:xfrm>
+          <a:prstGeom prst="straightConnector1">
+            <a:avLst/>
+          </a:prstGeom>
+          <a:ln>
+            <a:tailEnd type="triangle"/>
+          </a:ln>
+        </p:spPr>
+        <p:style>
+          <a:lnRef idx="1">
+            <a:schemeClr val="accent1"/>
+          </a:lnRef>
+          <a:fillRef idx="0">
+            <a:schemeClr val="accent1"/>
+          </a:fillRef>
+          <a:effectRef idx="0">
+            <a:schemeClr val="accent1"/>
+          </a:effectRef>
+          <a:fontRef idx="minor">
+            <a:schemeClr val="tx1"/>
+          </a:fontRef>
+        </p:style>
+      </p:cxnSp>
+    </p:spTree>
+    <p:extLst>
+      <p:ext uri="{BB962C8B-B14F-4D97-AF65-F5344CB8AC3E}">
+        <p14:creationId xmlns:p14="http://schemas.microsoft.com/office/powerpoint/2010/main" val="2455208540"/>
+      </p:ext>
+    </p:extLst>
+  </p:cSld>
+  <p:clrMapOvr>
+    <a:masterClrMapping/>
+  </p:clrMapOvr>
+  <p:timing>
+    <p:tnLst>
+      <p:par>
+        <p:cTn id="1" dur="indefinite" restart="never" nodeType="tmRoot"/>
+      </p:par>
+    </p:tnLst>
+  </p:timing>
+</p:sld>
+</file>
+
+<file path=ppt/slides/slide11.xml><?xml version="1.0" encoding="utf-8"?>
+<p:sld xmlns:a="http://schemas.openxmlformats.org/drawingml/2006/main" xmlns:r="http://schemas.openxmlformats.org/officeDocument/2006/relationships" xmlns:p="http://schemas.openxmlformats.org/presentationml/2006/main">
+  <p:cSld>
+    <p:spTree>
+      <p:nvGrpSpPr>
+        <p:cNvPr id="1" name=""/>
+        <p:cNvGrpSpPr/>
+        <p:nvPr/>
+      </p:nvGrpSpPr>
+      <p:grpSpPr>
+        <a:xfrm>
+          <a:off x="0" y="0"/>
+          <a:ext cx="0" cy="0"/>
+          <a:chOff x="0" y="0"/>
+          <a:chExt cx="0" cy="0"/>
+        </a:xfrm>
+      </p:grpSpPr>
+      <p:sp>
+        <p:nvSpPr>
           <p:cNvPr id="2" name="タイトル 1"/>
           <p:cNvSpPr>
             <a:spLocks noGrp="1"/>
@@ -3875,7 +4944,7 @@
 </p:sld>
 </file>
 
-<file path=ppt/slides/slide11.xml><?xml version="1.0" encoding="utf-8"?>
+<file path=ppt/slides/slide12.xml><?xml version="1.0" encoding="utf-8"?>
 <p:sld xmlns:a="http://schemas.openxmlformats.org/drawingml/2006/main" xmlns:r="http://schemas.openxmlformats.org/officeDocument/2006/relationships" xmlns:p="http://schemas.openxmlformats.org/presentationml/2006/main">
   <p:cSld>
     <p:spTree>
@@ -3960,7 +5029,11 @@
           <a:p>
             <a:r>
               <a:rPr kumimoji="1" lang="ja-JP" altLang="en-US" dirty="0" smtClean="0"/>
-              <a:t>一般的利用形態</a:t>
+              <a:t>別の利用</a:t>
+            </a:r>
+            <a:r>
+              <a:rPr kumimoji="1" lang="ja-JP" altLang="en-US" dirty="0" smtClean="0"/>
+              <a:t>形態</a:t>
             </a:r>
             <a:endParaRPr kumimoji="1" lang="ja-JP" altLang="en-US" dirty="0"/>
           </a:p>
@@ -5119,7 +6192,43 @@
             <a:pPr lvl="1"/>
             <a:r>
               <a:rPr kumimoji="1" lang="ja-JP" altLang="en-US" dirty="0" smtClean="0"/>
-              <a:t>分散型のバージョン管理システム</a:t>
+              <a:t>分散型のバージョン管理</a:t>
+            </a:r>
+            <a:r>
+              <a:rPr kumimoji="1" lang="ja-JP" altLang="en-US" dirty="0" smtClean="0"/>
+              <a:t>システム</a:t>
+            </a:r>
+            <a:endParaRPr kumimoji="1" lang="en-US" altLang="ja-JP" dirty="0" smtClean="0"/>
+          </a:p>
+          <a:p>
+            <a:pPr lvl="2"/>
+            <a:r>
+              <a:rPr kumimoji="1" lang="ja-JP" altLang="en-US" dirty="0" smtClean="0"/>
+              <a:t>分散型 </a:t>
+            </a:r>
+            <a:r>
+              <a:rPr kumimoji="1" lang="en-US" altLang="ja-JP" dirty="0" smtClean="0"/>
+              <a:t>- </a:t>
+            </a:r>
+            <a:r>
+              <a:rPr kumimoji="1" lang="ja-JP" altLang="en-US" dirty="0" smtClean="0"/>
+              <a:t>リポジトリ</a:t>
+            </a:r>
+            <a:r>
+              <a:rPr kumimoji="1" lang="en-US" altLang="ja-JP" dirty="0" smtClean="0"/>
+              <a:t>(</a:t>
+            </a:r>
+            <a:r>
+              <a:rPr kumimoji="1" lang="ja-JP" altLang="en-US" dirty="0" smtClean="0"/>
+              <a:t>変更履歴を含めたプロジェクトのファイルを記憶した一種のデータベース</a:t>
+            </a:r>
+            <a:r>
+              <a:rPr kumimoji="1" lang="en-US" altLang="ja-JP" dirty="0" smtClean="0"/>
+              <a:t>)</a:t>
+            </a:r>
+            <a:r>
+              <a:rPr kumimoji="1" lang="ja-JP" altLang="en-US" dirty="0" smtClean="0"/>
+              <a:t>を複数のホスト上に持てるシステム</a:t>
             </a:r>
             <a:endParaRPr kumimoji="1" lang="en-US" altLang="ja-JP" dirty="0" smtClean="0"/>
           </a:p>
@@ -5139,8 +6248,24 @@
             </a:r>
             <a:r>
               <a:rPr lang="ja-JP" altLang="en-US" dirty="0" smtClean="0"/>
-              <a:t>により開発された</a:t>
-            </a:r>
+              <a:t>により開発</a:t>
+            </a:r>
+            <a:r>
+              <a:rPr lang="ja-JP" altLang="en-US" dirty="0" smtClean="0"/>
+              <a:t>された</a:t>
+            </a:r>
+            <a:endParaRPr lang="en-US" altLang="ja-JP" dirty="0" smtClean="0"/>
+          </a:p>
+          <a:p>
+            <a:pPr lvl="2"/>
+            <a:r>
+              <a:rPr kumimoji="1" lang="ja-JP" altLang="en-US" dirty="0" smtClean="0"/>
+              <a:t>それまで使っていたバージョン管理システムが無償で使えなくなったため</a:t>
+            </a:r>
+            <a:endParaRPr kumimoji="1" lang="en-US" altLang="ja-JP" dirty="0" smtClean="0"/>
+          </a:p>
+          <a:p>
+            <a:pPr lvl="1"/>
             <a:endParaRPr kumimoji="1" lang="en-US" altLang="ja-JP" dirty="0" smtClean="0"/>
           </a:p>
           <a:p>
@@ -5233,12 +6358,8 @@
           <a:lstStyle/>
           <a:p>
             <a:r>
-              <a:rPr kumimoji="1" lang="en-US" altLang="ja-JP" dirty="0" err="1" smtClean="0"/>
-              <a:t>Git</a:t>
-            </a:r>
-            <a:r>
               <a:rPr kumimoji="1" lang="ja-JP" altLang="en-US" dirty="0" smtClean="0"/>
-              <a:t>の目的</a:t>
+              <a:t>バージョン管理システムとは</a:t>
             </a:r>
             <a:endParaRPr kumimoji="1" lang="ja-JP" altLang="en-US" dirty="0"/>
           </a:p>
@@ -5261,61 +6382,78 @@
           <a:p>
             <a:r>
               <a:rPr kumimoji="1" lang="ja-JP" altLang="en-US" dirty="0" smtClean="0"/>
-              <a:t>複数のユーザによる開発の支援</a:t>
+              <a:t>プロジェクトで使われるファイルの変更履歴を管理するシステム</a:t>
             </a:r>
             <a:endParaRPr kumimoji="1" lang="en-US" altLang="ja-JP" dirty="0" smtClean="0"/>
           </a:p>
           <a:p>
             <a:r>
               <a:rPr kumimoji="1" lang="ja-JP" altLang="en-US" dirty="0" smtClean="0"/>
-              <a:t>開発途中の変更履歴の管理</a:t>
+              <a:t>複数ユーザで開発を行うプロジェクトで主に使われている</a:t>
             </a:r>
             <a:endParaRPr kumimoji="1" lang="en-US" altLang="ja-JP" dirty="0" smtClean="0"/>
           </a:p>
           <a:p>
             <a:r>
+              <a:rPr kumimoji="1" lang="en-US" altLang="ja-JP" dirty="0" smtClean="0"/>
+              <a:t>VCS(Version Control System)</a:t>
+            </a:r>
+            <a:r>
               <a:rPr kumimoji="1" lang="ja-JP" altLang="en-US" dirty="0" smtClean="0"/>
-              <a:t>複数ユーザと管理者によるプロジェクトで以下のような処理をサポート</a:t>
+              <a:t>と呼ばれ</a:t>
             </a:r>
             <a:endParaRPr kumimoji="1" lang="en-US" altLang="ja-JP" dirty="0" smtClean="0"/>
           </a:p>
           <a:p>
             <a:pPr lvl="1"/>
             <a:r>
+              <a:rPr kumimoji="1" lang="en-US" altLang="ja-JP" dirty="0" smtClean="0"/>
+              <a:t>PVCS</a:t>
+            </a:r>
+            <a:r>
               <a:rPr kumimoji="1" lang="ja-JP" altLang="en-US" dirty="0" smtClean="0"/>
-              <a:t>各ユーザでローカルファイルの変更</a:t>
+              <a:t>　（</a:t>
+            </a:r>
+            <a:r>
+              <a:rPr kumimoji="1" lang="en-US" altLang="ja-JP" dirty="0" err="1" smtClean="0"/>
+              <a:t>Polytron</a:t>
+            </a:r>
+            <a:r>
+              <a:rPr kumimoji="1" lang="en-US" altLang="ja-JP" smtClean="0"/>
+              <a:t> Version Control System)</a:t>
             </a:r>
             <a:endParaRPr kumimoji="1" lang="en-US" altLang="ja-JP" dirty="0" smtClean="0"/>
           </a:p>
           <a:p>
             <a:pPr lvl="1"/>
             <a:r>
-              <a:rPr kumimoji="1" lang="ja-JP" altLang="en-US" dirty="0" smtClean="0"/>
-              <a:t>各ユーザごとローカル・ファイルの変更履歴の記憶</a:t>
-            </a:r>
-            <a:endParaRPr kumimoji="1" lang="en-US" altLang="ja-JP" dirty="0" smtClean="0"/>
+              <a:rPr kumimoji="1" lang="en-US" altLang="ja-JP" dirty="0" smtClean="0"/>
+              <a:t>VCS</a:t>
+            </a:r>
           </a:p>
           <a:p>
             <a:pPr lvl="1"/>
             <a:r>
-              <a:rPr kumimoji="1" lang="ja-JP" altLang="en-US" dirty="0" smtClean="0"/>
-              <a:t>各ユーザのローカルの変更履歴をサーバに記録</a:t>
-            </a:r>
-            <a:endParaRPr kumimoji="1" lang="en-US" altLang="ja-JP" dirty="0" smtClean="0"/>
+              <a:rPr kumimoji="1" lang="en-US" altLang="ja-JP" dirty="0" smtClean="0"/>
+              <a:t>Microsoft VCS</a:t>
+            </a:r>
           </a:p>
           <a:p>
             <a:pPr lvl="1"/>
             <a:r>
-              <a:rPr kumimoji="1" lang="ja-JP" altLang="en-US" dirty="0" smtClean="0"/>
-              <a:t>管理者による変更履歴のレビューとサーバに許可した変更履歴を記録</a:t>
-            </a:r>
-            <a:endParaRPr kumimoji="1" lang="en-US" altLang="ja-JP" dirty="0" smtClean="0"/>
+              <a:rPr kumimoji="1" lang="en-US" altLang="ja-JP" dirty="0" smtClean="0"/>
+              <a:t>CVS</a:t>
+            </a:r>
           </a:p>
           <a:p>
             <a:pPr lvl="1"/>
             <a:r>
-              <a:rPr kumimoji="1" lang="ja-JP" altLang="en-US" smtClean="0"/>
-              <a:t>他のユーザが行った変更で許可された変更のローカルへの取り込み</a:t>
+              <a:rPr kumimoji="1" lang="en-US" altLang="ja-JP" dirty="0" err="1" smtClean="0"/>
+              <a:t>Subverion</a:t>
+            </a:r>
+            <a:r>
+              <a:rPr kumimoji="1" lang="en-US" altLang="ja-JP" dirty="0" smtClean="0"/>
+              <a:t> (SVN)</a:t>
             </a:r>
             <a:endParaRPr kumimoji="1" lang="ja-JP" altLang="en-US" dirty="0"/>
           </a:p>
@@ -5324,7 +6462,7 @@
     </p:spTree>
     <p:extLst>
       <p:ext uri="{BB962C8B-B14F-4D97-AF65-F5344CB8AC3E}">
-        <p14:creationId xmlns:p14="http://schemas.microsoft.com/office/powerpoint/2010/main" val="874316441"/>
+        <p14:creationId xmlns:p14="http://schemas.microsoft.com/office/powerpoint/2010/main" val="1703713577"/>
       </p:ext>
     </p:extLst>
   </p:cSld>
@@ -5379,7 +6517,7 @@
             </a:r>
             <a:r>
               <a:rPr kumimoji="1" lang="ja-JP" altLang="en-US" dirty="0" smtClean="0"/>
-              <a:t>の入手方法</a:t>
+              <a:t>の目的</a:t>
             </a:r>
             <a:endParaRPr kumimoji="1" lang="ja-JP" altLang="en-US" dirty="0"/>
           </a:p>
@@ -5402,62 +6540,61 @@
           <a:p>
             <a:r>
               <a:rPr kumimoji="1" lang="ja-JP" altLang="en-US" dirty="0" smtClean="0"/>
-              <a:t>サーバ版</a:t>
+              <a:t>複数のユーザによる開発の支援</a:t>
             </a:r>
             <a:endParaRPr kumimoji="1" lang="en-US" altLang="ja-JP" dirty="0" smtClean="0"/>
           </a:p>
           <a:p>
+            <a:r>
+              <a:rPr kumimoji="1" lang="ja-JP" altLang="en-US" dirty="0" smtClean="0"/>
+              <a:t>開発途中の変更履歴の管理</a:t>
+            </a:r>
+            <a:endParaRPr kumimoji="1" lang="en-US" altLang="ja-JP" dirty="0" smtClean="0"/>
+          </a:p>
+          <a:p>
+            <a:r>
+              <a:rPr kumimoji="1" lang="ja-JP" altLang="en-US" dirty="0" smtClean="0"/>
+              <a:t>複数ユーザと管理者によるプロジェクトで以下のような処理をサポート</a:t>
+            </a:r>
+            <a:endParaRPr kumimoji="1" lang="en-US" altLang="ja-JP" dirty="0" smtClean="0"/>
+          </a:p>
+          <a:p>
             <a:pPr lvl="1"/>
             <a:r>
-              <a:rPr kumimoji="1" lang="en-US" altLang="ja-JP" dirty="0" smtClean="0"/>
-              <a:t>Windows</a:t>
-            </a:r>
-            <a:r>
               <a:rPr kumimoji="1" lang="ja-JP" altLang="en-US" dirty="0" smtClean="0"/>
-              <a:t>用</a:t>
+              <a:t>各ユーザでローカルファイルの変更</a:t>
             </a:r>
             <a:endParaRPr kumimoji="1" lang="en-US" altLang="ja-JP" dirty="0" smtClean="0"/>
           </a:p>
           <a:p>
             <a:pPr lvl="1"/>
             <a:r>
-              <a:rPr kumimoji="1" lang="en-US" altLang="ja-JP" dirty="0" smtClean="0"/>
-              <a:t>Linux</a:t>
-            </a:r>
-            <a:r>
               <a:rPr kumimoji="1" lang="ja-JP" altLang="en-US" dirty="0" smtClean="0"/>
-              <a:t>用</a:t>
+              <a:t>各ユーザごとローカル・ファイルの変更履歴の記憶</a:t>
             </a:r>
             <a:endParaRPr kumimoji="1" lang="en-US" altLang="ja-JP" dirty="0" smtClean="0"/>
           </a:p>
           <a:p>
+            <a:pPr lvl="1"/>
             <a:r>
               <a:rPr kumimoji="1" lang="ja-JP" altLang="en-US" dirty="0" smtClean="0"/>
-              <a:t>クライアント版</a:t>
+              <a:t>各ユーザのローカルの変更履歴をサーバに記録</a:t>
             </a:r>
             <a:endParaRPr kumimoji="1" lang="en-US" altLang="ja-JP" dirty="0" smtClean="0"/>
           </a:p>
           <a:p>
             <a:pPr lvl="1"/>
             <a:r>
-              <a:rPr lang="en-US" altLang="ja-JP" dirty="0" smtClean="0"/>
-              <a:t>Windows</a:t>
-            </a:r>
-            <a:r>
-              <a:rPr lang="ja-JP" altLang="en-US" dirty="0" smtClean="0"/>
-              <a:t>用</a:t>
-            </a:r>
-            <a:endParaRPr lang="en-US" altLang="ja-JP" dirty="0" smtClean="0"/>
+              <a:rPr kumimoji="1" lang="ja-JP" altLang="en-US" dirty="0" smtClean="0"/>
+              <a:t>管理者による変更履歴のレビューとサーバに許可した変更履歴を記録</a:t>
+            </a:r>
+            <a:endParaRPr kumimoji="1" lang="en-US" altLang="ja-JP" dirty="0" smtClean="0"/>
           </a:p>
           <a:p>
             <a:pPr lvl="1"/>
             <a:r>
-              <a:rPr kumimoji="1" lang="en-US" altLang="ja-JP" dirty="0" smtClean="0"/>
-              <a:t>Linux</a:t>
-            </a:r>
-            <a:r>
-              <a:rPr kumimoji="1" lang="ja-JP" altLang="en-US" dirty="0" smtClean="0"/>
-              <a:t>用</a:t>
+              <a:rPr kumimoji="1" lang="ja-JP" altLang="en-US" smtClean="0"/>
+              <a:t>他のユーザが行った変更で許可された変更のローカルへの取り込み</a:t>
             </a:r>
             <a:endParaRPr kumimoji="1" lang="ja-JP" altLang="en-US" dirty="0"/>
           </a:p>
@@ -5466,7 +6603,7 @@
     </p:spTree>
     <p:extLst>
       <p:ext uri="{BB962C8B-B14F-4D97-AF65-F5344CB8AC3E}">
-        <p14:creationId xmlns:p14="http://schemas.microsoft.com/office/powerpoint/2010/main" val="1820681041"/>
+        <p14:creationId xmlns:p14="http://schemas.microsoft.com/office/powerpoint/2010/main" val="874316441"/>
       </p:ext>
     </p:extLst>
   </p:cSld>
@@ -5521,7 +6658,7 @@
             </a:r>
             <a:r>
               <a:rPr kumimoji="1" lang="ja-JP" altLang="en-US" dirty="0" smtClean="0"/>
-              <a:t>の基本</a:t>
+              <a:t>の入手方法</a:t>
             </a:r>
             <a:endParaRPr kumimoji="1" lang="ja-JP" altLang="en-US" dirty="0"/>
           </a:p>
@@ -5544,6 +6681,148 @@
           <a:p>
             <a:r>
               <a:rPr kumimoji="1" lang="ja-JP" altLang="en-US" dirty="0" smtClean="0"/>
+              <a:t>サーバ版</a:t>
+            </a:r>
+            <a:endParaRPr kumimoji="1" lang="en-US" altLang="ja-JP" dirty="0" smtClean="0"/>
+          </a:p>
+          <a:p>
+            <a:pPr lvl="1"/>
+            <a:r>
+              <a:rPr kumimoji="1" lang="en-US" altLang="ja-JP" dirty="0" smtClean="0"/>
+              <a:t>Windows</a:t>
+            </a:r>
+            <a:r>
+              <a:rPr kumimoji="1" lang="ja-JP" altLang="en-US" dirty="0" smtClean="0"/>
+              <a:t>用</a:t>
+            </a:r>
+            <a:endParaRPr kumimoji="1" lang="en-US" altLang="ja-JP" dirty="0" smtClean="0"/>
+          </a:p>
+          <a:p>
+            <a:pPr lvl="1"/>
+            <a:r>
+              <a:rPr kumimoji="1" lang="en-US" altLang="ja-JP" dirty="0" smtClean="0"/>
+              <a:t>Linux</a:t>
+            </a:r>
+            <a:r>
+              <a:rPr kumimoji="1" lang="ja-JP" altLang="en-US" dirty="0" smtClean="0"/>
+              <a:t>用</a:t>
+            </a:r>
+            <a:endParaRPr kumimoji="1" lang="en-US" altLang="ja-JP" dirty="0" smtClean="0"/>
+          </a:p>
+          <a:p>
+            <a:r>
+              <a:rPr kumimoji="1" lang="ja-JP" altLang="en-US" dirty="0" smtClean="0"/>
+              <a:t>クライアント版</a:t>
+            </a:r>
+            <a:endParaRPr kumimoji="1" lang="en-US" altLang="ja-JP" dirty="0" smtClean="0"/>
+          </a:p>
+          <a:p>
+            <a:pPr lvl="1"/>
+            <a:r>
+              <a:rPr lang="en-US" altLang="ja-JP" dirty="0" smtClean="0"/>
+              <a:t>Windows</a:t>
+            </a:r>
+            <a:r>
+              <a:rPr lang="ja-JP" altLang="en-US" dirty="0" smtClean="0"/>
+              <a:t>用</a:t>
+            </a:r>
+            <a:endParaRPr lang="en-US" altLang="ja-JP" dirty="0" smtClean="0"/>
+          </a:p>
+          <a:p>
+            <a:pPr lvl="1"/>
+            <a:r>
+              <a:rPr kumimoji="1" lang="en-US" altLang="ja-JP" dirty="0" smtClean="0"/>
+              <a:t>Linux</a:t>
+            </a:r>
+            <a:r>
+              <a:rPr kumimoji="1" lang="ja-JP" altLang="en-US" dirty="0" smtClean="0"/>
+              <a:t>用</a:t>
+            </a:r>
+            <a:endParaRPr kumimoji="1" lang="ja-JP" altLang="en-US" dirty="0"/>
+          </a:p>
+        </p:txBody>
+      </p:sp>
+    </p:spTree>
+    <p:extLst>
+      <p:ext uri="{BB962C8B-B14F-4D97-AF65-F5344CB8AC3E}">
+        <p14:creationId xmlns:p14="http://schemas.microsoft.com/office/powerpoint/2010/main" val="1820681041"/>
+      </p:ext>
+    </p:extLst>
+  </p:cSld>
+  <p:clrMapOvr>
+    <a:masterClrMapping/>
+  </p:clrMapOvr>
+  <p:timing>
+    <p:tnLst>
+      <p:par>
+        <p:cTn id="1" dur="indefinite" restart="never" nodeType="tmRoot"/>
+      </p:par>
+    </p:tnLst>
+  </p:timing>
+</p:sld>
+</file>
+
+<file path=ppt/slides/slide6.xml><?xml version="1.0" encoding="utf-8"?>
+<p:sld xmlns:a="http://schemas.openxmlformats.org/drawingml/2006/main" xmlns:r="http://schemas.openxmlformats.org/officeDocument/2006/relationships" xmlns:p="http://schemas.openxmlformats.org/presentationml/2006/main">
+  <p:cSld>
+    <p:spTree>
+      <p:nvGrpSpPr>
+        <p:cNvPr id="1" name=""/>
+        <p:cNvGrpSpPr/>
+        <p:nvPr/>
+      </p:nvGrpSpPr>
+      <p:grpSpPr>
+        <a:xfrm>
+          <a:off x="0" y="0"/>
+          <a:ext cx="0" cy="0"/>
+          <a:chOff x="0" y="0"/>
+          <a:chExt cx="0" cy="0"/>
+        </a:xfrm>
+      </p:grpSpPr>
+      <p:sp>
+        <p:nvSpPr>
+          <p:cNvPr id="2" name="タイトル 1"/>
+          <p:cNvSpPr>
+            <a:spLocks noGrp="1"/>
+          </p:cNvSpPr>
+          <p:nvPr>
+            <p:ph type="title"/>
+          </p:nvPr>
+        </p:nvSpPr>
+        <p:spPr/>
+        <p:txBody>
+          <a:bodyPr/>
+          <a:lstStyle/>
+          <a:p>
+            <a:r>
+              <a:rPr kumimoji="1" lang="en-US" altLang="ja-JP" dirty="0" err="1" smtClean="0"/>
+              <a:t>Git</a:t>
+            </a:r>
+            <a:r>
+              <a:rPr kumimoji="1" lang="ja-JP" altLang="en-US" dirty="0" smtClean="0"/>
+              <a:t>の基本</a:t>
+            </a:r>
+            <a:endParaRPr kumimoji="1" lang="ja-JP" altLang="en-US" dirty="0"/>
+          </a:p>
+        </p:txBody>
+      </p:sp>
+      <p:sp>
+        <p:nvSpPr>
+          <p:cNvPr id="3" name="コンテンツ プレースホルダー 2"/>
+          <p:cNvSpPr>
+            <a:spLocks noGrp="1"/>
+          </p:cNvSpPr>
+          <p:nvPr>
+            <p:ph idx="1"/>
+          </p:nvPr>
+        </p:nvSpPr>
+        <p:spPr/>
+        <p:txBody>
+          <a:bodyPr/>
+          <a:lstStyle/>
+          <a:p>
+            <a:r>
+              <a:rPr kumimoji="1" lang="ja-JP" altLang="en-US" dirty="0" smtClean="0"/>
               <a:t>リモート・リポジトリ</a:t>
             </a:r>
             <a:endParaRPr kumimoji="1" lang="en-US" altLang="ja-JP" dirty="0" smtClean="0"/>
@@ -5616,7 +6895,6 @@
               <a:rPr kumimoji="1" lang="en-US" altLang="ja-JP" dirty="0" smtClean="0"/>
               <a:t>))</a:t>
             </a:r>
-            <a:endParaRPr kumimoji="1" lang="en-US" altLang="ja-JP" dirty="0" smtClean="0"/>
           </a:p>
           <a:p>
             <a:pPr lvl="1"/>
@@ -5691,7 +6969,7 @@
 </p:sld>
 </file>
 
-<file path=ppt/slides/slide6.xml><?xml version="1.0" encoding="utf-8"?>
+<file path=ppt/slides/slide7.xml><?xml version="1.0" encoding="utf-8"?>
 <p:sld xmlns:a="http://schemas.openxmlformats.org/drawingml/2006/main" xmlns:r="http://schemas.openxmlformats.org/officeDocument/2006/relationships" xmlns:p="http://schemas.openxmlformats.org/presentationml/2006/main">
   <p:cSld>
     <p:spTree>
@@ -6855,7 +8133,7 @@
 </p:sld>
 </file>
 
-<file path=ppt/slides/slide7.xml><?xml version="1.0" encoding="utf-8"?>
+<file path=ppt/slides/slide8.xml><?xml version="1.0" encoding="utf-8"?>
 <p:sld xmlns:a="http://schemas.openxmlformats.org/drawingml/2006/main" xmlns:r="http://schemas.openxmlformats.org/officeDocument/2006/relationships" xmlns:p="http://schemas.openxmlformats.org/presentationml/2006/main">
   <p:cSld>
     <p:spTree>
@@ -6910,7 +8188,7 @@
         <p:spPr>
           <a:xfrm>
             <a:off x="838200" y="1497239"/>
-            <a:ext cx="10515600" cy="3477532"/>
+            <a:ext cx="10515600" cy="4794704"/>
           </a:xfrm>
           <a:prstGeom prst="rect">
             <a:avLst/>
@@ -6918,7 +8196,7 @@
         </p:spPr>
         <p:txBody>
           <a:bodyPr vert="horz" lIns="91440" tIns="45720" rIns="91440" bIns="45720" rtlCol="0" anchor="ctr">
-            <a:normAutofit fontScale="92500" lnSpcReduction="20000"/>
+            <a:normAutofit/>
           </a:bodyPr>
           <a:lstStyle>
             <a:lvl1pPr algn="l" defTabSz="914400" rtl="0" eaLnBrk="1" latinLnBrk="0" hangingPunct="1">
@@ -6941,17 +8219,216 @@
           </a:lstStyle>
           <a:p>
             <a:pPr marL="457200" indent="-457200">
+              <a:lnSpc>
+                <a:spcPct val="100000"/>
+              </a:lnSpc>
               <a:buFont typeface="Arial" panose="020B0604020202020204" pitchFamily="34" charset="0"/>
               <a:buChar char="•"/>
             </a:pPr>
             <a:r>
-              <a:rPr lang="ja-JP" altLang="en-US" sz="3000" dirty="0" smtClean="0">
+              <a:rPr lang="ja-JP" altLang="en-US" sz="2800" dirty="0" smtClean="0">
                 <a:latin typeface="ＭＳ Ｐゴシック" panose="020B0600070205080204" pitchFamily="50" charset="-128"/>
                 <a:ea typeface="ＭＳ Ｐゴシック" panose="020B0600070205080204" pitchFamily="50" charset="-128"/>
               </a:rPr>
               <a:t>変更の元になった方に矢印を向ける</a:t>
             </a:r>
-            <a:endParaRPr lang="en-US" altLang="ja-JP" sz="3000" dirty="0" smtClean="0">
+            <a:endParaRPr lang="en-US" altLang="ja-JP" sz="2800" dirty="0" smtClean="0">
+              <a:latin typeface="ＭＳ Ｐゴシック" panose="020B0600070205080204" pitchFamily="50" charset="-128"/>
+              <a:ea typeface="ＭＳ Ｐゴシック" panose="020B0600070205080204" pitchFamily="50" charset="-128"/>
+            </a:endParaRPr>
+          </a:p>
+          <a:p>
+            <a:pPr marL="457200" indent="-457200">
+              <a:lnSpc>
+                <a:spcPct val="100000"/>
+              </a:lnSpc>
+              <a:buFont typeface="Arial" panose="020B0604020202020204" pitchFamily="34" charset="0"/>
+              <a:buChar char="•"/>
+            </a:pPr>
+            <a:r>
+              <a:rPr lang="ja-JP" altLang="en-US" sz="2800" dirty="0" smtClean="0">
+                <a:latin typeface="ＭＳ Ｐゴシック" panose="020B0600070205080204" pitchFamily="50" charset="-128"/>
+                <a:ea typeface="ＭＳ Ｐゴシック" panose="020B0600070205080204" pitchFamily="50" charset="-128"/>
+              </a:rPr>
+              <a:t>時系列で変わっていく方向ではなく、元がどっちかを示す</a:t>
+            </a:r>
+            <a:endParaRPr lang="en-US" altLang="ja-JP" sz="2800" dirty="0" smtClean="0">
+              <a:latin typeface="ＭＳ Ｐゴシック" panose="020B0600070205080204" pitchFamily="50" charset="-128"/>
+              <a:ea typeface="ＭＳ Ｐゴシック" panose="020B0600070205080204" pitchFamily="50" charset="-128"/>
+            </a:endParaRPr>
+          </a:p>
+          <a:p>
+            <a:pPr lvl="2"/>
+            <a:endParaRPr lang="en-US" altLang="ja-JP" sz="2000" dirty="0" smtClean="0"/>
+          </a:p>
+          <a:p>
+            <a:pPr lvl="2"/>
+            <a:r>
+              <a:rPr lang="en-US" altLang="ja-JP" sz="2000" dirty="0" smtClean="0"/>
+              <a:t>A</a:t>
+            </a:r>
+            <a:r>
+              <a:rPr lang="ja-JP" altLang="en-US" sz="2000" dirty="0"/>
+              <a:t>に編集を加えたものが</a:t>
+            </a:r>
+            <a:r>
+              <a:rPr lang="en-US" altLang="ja-JP" sz="2000" dirty="0"/>
+              <a:t>B</a:t>
+            </a:r>
+            <a:r>
+              <a:rPr lang="ja-JP" altLang="en-US" sz="2000" dirty="0"/>
+              <a:t>でさらに</a:t>
+            </a:r>
+            <a:r>
+              <a:rPr lang="en-US" altLang="ja-JP" sz="2000" dirty="0"/>
+              <a:t>B</a:t>
+            </a:r>
+            <a:r>
+              <a:rPr lang="ja-JP" altLang="en-US" sz="2000" dirty="0"/>
+              <a:t>に編集を加えたものが</a:t>
+            </a:r>
+            <a:r>
+              <a:rPr lang="en-US" altLang="ja-JP" sz="2000" dirty="0"/>
+              <a:t>C</a:t>
+            </a:r>
+            <a:r>
+              <a:rPr lang="ja-JP" altLang="en-US" sz="2000" dirty="0"/>
+              <a:t>の場合</a:t>
+            </a:r>
+            <a:endParaRPr lang="en-US" altLang="ja-JP" sz="2000" dirty="0"/>
+          </a:p>
+          <a:p>
+            <a:pPr lvl="2"/>
+            <a:r>
+              <a:rPr lang="en-US" altLang="ja-JP" sz="2400" dirty="0"/>
+              <a:t>	A</a:t>
+            </a:r>
+            <a:r>
+              <a:rPr lang="ja-JP" altLang="en-US" sz="2400" dirty="0"/>
+              <a:t> ← </a:t>
+            </a:r>
+            <a:r>
+              <a:rPr lang="en-US" altLang="ja-JP" sz="2400" dirty="0"/>
+              <a:t>B </a:t>
+            </a:r>
+            <a:r>
+              <a:rPr lang="ja-JP" altLang="en-US" sz="2400" dirty="0"/>
+              <a:t>← </a:t>
+            </a:r>
+            <a:r>
+              <a:rPr lang="en-US" altLang="ja-JP" sz="2400" dirty="0" smtClean="0"/>
+              <a:t>C</a:t>
+            </a:r>
+            <a:endParaRPr lang="en-US" altLang="ja-JP" sz="2800" dirty="0">
+              <a:latin typeface="ＭＳ Ｐゴシック" panose="020B0600070205080204" pitchFamily="50" charset="-128"/>
+              <a:ea typeface="ＭＳ Ｐゴシック" panose="020B0600070205080204" pitchFamily="50" charset="-128"/>
+            </a:endParaRPr>
+          </a:p>
+          <a:p>
+            <a:pPr marL="457200" indent="-457200">
+              <a:lnSpc>
+                <a:spcPct val="100000"/>
+              </a:lnSpc>
+              <a:buFont typeface="Arial" panose="020B0604020202020204" pitchFamily="34" charset="0"/>
+              <a:buChar char="•"/>
+            </a:pPr>
+            <a:endParaRPr lang="en-US" altLang="ja-JP" sz="2800" dirty="0" smtClean="0">
+              <a:latin typeface="ＭＳ Ｐゴシック" panose="020B0600070205080204" pitchFamily="50" charset="-128"/>
+              <a:ea typeface="ＭＳ Ｐゴシック" panose="020B0600070205080204" pitchFamily="50" charset="-128"/>
+            </a:endParaRPr>
+          </a:p>
+          <a:p>
+            <a:pPr marL="457200" indent="-457200">
+              <a:lnSpc>
+                <a:spcPct val="100000"/>
+              </a:lnSpc>
+              <a:buFont typeface="Arial" panose="020B0604020202020204" pitchFamily="34" charset="0"/>
+              <a:buChar char="•"/>
+            </a:pPr>
+            <a:r>
+              <a:rPr lang="ja-JP" altLang="en-US" sz="2800" dirty="0">
+                <a:latin typeface="ＭＳ Ｐゴシック" panose="020B0600070205080204" pitchFamily="50" charset="-128"/>
+                <a:ea typeface="ＭＳ Ｐゴシック" panose="020B0600070205080204" pitchFamily="50" charset="-128"/>
+              </a:rPr>
+              <a:t>オブジェクト指向の表現でも、派生先に矢印を向けるのではなく、元になったクラスやオブジェクトの方に矢印を</a:t>
+            </a:r>
+            <a:r>
+              <a:rPr lang="ja-JP" altLang="en-US" sz="2800" dirty="0" smtClean="0">
+                <a:latin typeface="ＭＳ Ｐゴシック" panose="020B0600070205080204" pitchFamily="50" charset="-128"/>
+                <a:ea typeface="ＭＳ Ｐゴシック" panose="020B0600070205080204" pitchFamily="50" charset="-128"/>
+              </a:rPr>
+              <a:t>向ける（子オブジェクトから親オブジェクトに矢印を向ける</a:t>
+            </a:r>
+            <a:r>
+              <a:rPr lang="en-US" altLang="ja-JP" sz="2800" dirty="0" smtClean="0">
+                <a:latin typeface="ＭＳ Ｐゴシック" panose="020B0600070205080204" pitchFamily="50" charset="-128"/>
+                <a:ea typeface="ＭＳ Ｐゴシック" panose="020B0600070205080204" pitchFamily="50" charset="-128"/>
+              </a:rPr>
+              <a:t>)</a:t>
+            </a:r>
+            <a:r>
+              <a:rPr lang="ja-JP" altLang="en-US" sz="2800" dirty="0" smtClean="0">
+                <a:latin typeface="ＭＳ Ｐゴシック" panose="020B0600070205080204" pitchFamily="50" charset="-128"/>
+                <a:ea typeface="ＭＳ Ｐゴシック" panose="020B0600070205080204" pitchFamily="50" charset="-128"/>
+              </a:rPr>
+              <a:t>図</a:t>
+            </a:r>
+            <a:r>
+              <a:rPr lang="ja-JP" altLang="en-US" sz="2800" dirty="0">
+                <a:latin typeface="ＭＳ Ｐゴシック" panose="020B0600070205080204" pitchFamily="50" charset="-128"/>
+                <a:ea typeface="ＭＳ Ｐゴシック" panose="020B0600070205080204" pitchFamily="50" charset="-128"/>
+              </a:rPr>
+              <a:t>が多い（</a:t>
+            </a:r>
+            <a:r>
+              <a:rPr lang="en-US" altLang="ja-JP" sz="2800" dirty="0">
+                <a:latin typeface="ＭＳ Ｐゴシック" panose="020B0600070205080204" pitchFamily="50" charset="-128"/>
+                <a:ea typeface="ＭＳ Ｐゴシック" panose="020B0600070205080204" pitchFamily="50" charset="-128"/>
+              </a:rPr>
+              <a:t>UML</a:t>
+            </a:r>
+            <a:r>
+              <a:rPr lang="ja-JP" altLang="en-US" sz="2800" dirty="0">
+                <a:latin typeface="ＭＳ Ｐゴシック" panose="020B0600070205080204" pitchFamily="50" charset="-128"/>
+                <a:ea typeface="ＭＳ Ｐゴシック" panose="020B0600070205080204" pitchFamily="50" charset="-128"/>
+              </a:rPr>
+              <a:t>等）</a:t>
+            </a:r>
+            <a:endParaRPr lang="en-US" altLang="ja-JP" sz="2800" dirty="0">
+              <a:latin typeface="ＭＳ Ｐゴシック" panose="020B0600070205080204" pitchFamily="50" charset="-128"/>
+              <a:ea typeface="ＭＳ Ｐゴシック" panose="020B0600070205080204" pitchFamily="50" charset="-128"/>
+            </a:endParaRPr>
+          </a:p>
+          <a:p>
+            <a:pPr marL="457200" indent="-457200">
+              <a:lnSpc>
+                <a:spcPct val="100000"/>
+              </a:lnSpc>
+              <a:buFont typeface="Arial" panose="020B0604020202020204" pitchFamily="34" charset="0"/>
+              <a:buChar char="•"/>
+            </a:pPr>
+            <a:r>
+              <a:rPr lang="ja-JP" altLang="en-US" sz="2800" dirty="0">
+                <a:latin typeface="ＭＳ Ｐゴシック" panose="020B0600070205080204" pitchFamily="50" charset="-128"/>
+                <a:ea typeface="ＭＳ Ｐゴシック" panose="020B0600070205080204" pitchFamily="50" charset="-128"/>
+              </a:rPr>
+              <a:t>時系列的な</a:t>
+            </a:r>
+            <a:r>
+              <a:rPr lang="en-US" altLang="ja-JP" sz="2800" dirty="0">
+                <a:latin typeface="ＭＳ Ｐゴシック" panose="020B0600070205080204" pitchFamily="50" charset="-128"/>
+                <a:ea typeface="ＭＳ Ｐゴシック" panose="020B0600070205080204" pitchFamily="50" charset="-128"/>
+              </a:rPr>
+              <a:t>Flow</a:t>
+            </a:r>
+            <a:r>
+              <a:rPr lang="ja-JP" altLang="en-US" sz="2800" dirty="0">
+                <a:latin typeface="ＭＳ Ｐゴシック" panose="020B0600070205080204" pitchFamily="50" charset="-128"/>
+                <a:ea typeface="ＭＳ Ｐゴシック" panose="020B0600070205080204" pitchFamily="50" charset="-128"/>
+              </a:rPr>
+              <a:t>とは逆になるので気持ち悪い人もいるかも</a:t>
+            </a:r>
+            <a:endParaRPr lang="en-US" altLang="ja-JP" sz="2800" dirty="0">
               <a:latin typeface="ＭＳ Ｐゴシック" panose="020B0600070205080204" pitchFamily="50" charset="-128"/>
               <a:ea typeface="ＭＳ Ｐゴシック" panose="020B0600070205080204" pitchFamily="50" charset="-128"/>
             </a:endParaRPr>
@@ -6961,202 +8438,7 @@
               <a:buFont typeface="Arial" panose="020B0604020202020204" pitchFamily="34" charset="0"/>
               <a:buChar char="•"/>
             </a:pPr>
-            <a:r>
-              <a:rPr lang="ja-JP" altLang="en-US" sz="3000" dirty="0" smtClean="0">
-                <a:latin typeface="ＭＳ Ｐゴシック" panose="020B0600070205080204" pitchFamily="50" charset="-128"/>
-                <a:ea typeface="ＭＳ Ｐゴシック" panose="020B0600070205080204" pitchFamily="50" charset="-128"/>
-              </a:rPr>
-              <a:t>時系列で変わっていく方向ではなく、元がどっちかを示す</a:t>
-            </a:r>
-            <a:endParaRPr lang="en-US" altLang="ja-JP" sz="3000" dirty="0" smtClean="0">
-              <a:latin typeface="ＭＳ Ｐゴシック" panose="020B0600070205080204" pitchFamily="50" charset="-128"/>
-              <a:ea typeface="ＭＳ Ｐゴシック" panose="020B0600070205080204" pitchFamily="50" charset="-128"/>
-            </a:endParaRPr>
-          </a:p>
-          <a:p>
-            <a:pPr lvl="2"/>
-            <a:endParaRPr lang="en-US" altLang="ja-JP" sz="2400" dirty="0" smtClean="0"/>
-          </a:p>
-          <a:p>
-            <a:pPr lvl="2"/>
-            <a:r>
-              <a:rPr lang="en-US" altLang="ja-JP" sz="2400" dirty="0" smtClean="0"/>
-              <a:t>A</a:t>
-            </a:r>
-            <a:r>
-              <a:rPr lang="ja-JP" altLang="en-US" sz="2400" dirty="0"/>
-              <a:t>に編集を加えたものが</a:t>
-            </a:r>
-            <a:r>
-              <a:rPr lang="en-US" altLang="ja-JP" sz="2400" dirty="0"/>
-              <a:t>B</a:t>
-            </a:r>
-            <a:r>
-              <a:rPr lang="ja-JP" altLang="en-US" sz="2400" dirty="0"/>
-              <a:t>でさらに</a:t>
-            </a:r>
-            <a:r>
-              <a:rPr lang="en-US" altLang="ja-JP" sz="2400" dirty="0"/>
-              <a:t>B</a:t>
-            </a:r>
-            <a:r>
-              <a:rPr lang="ja-JP" altLang="en-US" sz="2400" dirty="0"/>
-              <a:t>に編集を加えたものが</a:t>
-            </a:r>
-            <a:r>
-              <a:rPr lang="en-US" altLang="ja-JP" sz="2400" dirty="0"/>
-              <a:t>C</a:t>
-            </a:r>
-            <a:r>
-              <a:rPr lang="ja-JP" altLang="en-US" sz="2400" dirty="0"/>
-              <a:t>の場合</a:t>
-            </a:r>
-            <a:endParaRPr lang="en-US" altLang="ja-JP" sz="2400" dirty="0"/>
-          </a:p>
-          <a:p>
-            <a:pPr lvl="2"/>
-            <a:r>
-              <a:rPr lang="en-US" altLang="ja-JP" sz="2800" dirty="0"/>
-              <a:t>	A</a:t>
-            </a:r>
-            <a:r>
-              <a:rPr lang="ja-JP" altLang="en-US" sz="2800" dirty="0"/>
-              <a:t> ← </a:t>
-            </a:r>
-            <a:r>
-              <a:rPr lang="en-US" altLang="ja-JP" sz="2800" dirty="0"/>
-              <a:t>B </a:t>
-            </a:r>
-            <a:r>
-              <a:rPr lang="ja-JP" altLang="en-US" sz="2800" dirty="0"/>
-              <a:t>← </a:t>
-            </a:r>
-            <a:r>
-              <a:rPr lang="en-US" altLang="ja-JP" sz="2800" dirty="0"/>
-              <a:t>C</a:t>
-            </a:r>
-          </a:p>
-          <a:p>
-            <a:pPr lvl="2"/>
-            <a:r>
-              <a:rPr lang="ja-JP" altLang="en-US" sz="2400" dirty="0"/>
-              <a:t>と表示</a:t>
-            </a:r>
-            <a:r>
-              <a:rPr lang="ja-JP" altLang="en-US" sz="2400" dirty="0" smtClean="0"/>
-              <a:t>する</a:t>
-            </a:r>
-            <a:endParaRPr lang="en-US" altLang="ja-JP" sz="3000" dirty="0">
-              <a:latin typeface="ＭＳ Ｐゴシック" panose="020B0600070205080204" pitchFamily="50" charset="-128"/>
-              <a:ea typeface="ＭＳ Ｐゴシック" panose="020B0600070205080204" pitchFamily="50" charset="-128"/>
-            </a:endParaRPr>
-          </a:p>
-          <a:p>
-            <a:pPr marL="457200" indent="-457200">
-              <a:buFont typeface="Arial" panose="020B0604020202020204" pitchFamily="34" charset="0"/>
-              <a:buChar char="•"/>
-            </a:pPr>
-            <a:endParaRPr lang="en-US" altLang="ja-JP" sz="3000" dirty="0" smtClean="0">
-              <a:latin typeface="ＭＳ Ｐゴシック" panose="020B0600070205080204" pitchFamily="50" charset="-128"/>
-              <a:ea typeface="ＭＳ Ｐゴシック" panose="020B0600070205080204" pitchFamily="50" charset="-128"/>
-            </a:endParaRPr>
-          </a:p>
-          <a:p>
-            <a:pPr marL="457200" indent="-457200">
-              <a:buFont typeface="Arial" panose="020B0604020202020204" pitchFamily="34" charset="0"/>
-              <a:buChar char="•"/>
-            </a:pPr>
-            <a:r>
-              <a:rPr lang="ja-JP" altLang="en-US" sz="3000" dirty="0">
-                <a:latin typeface="ＭＳ Ｐゴシック" panose="020B0600070205080204" pitchFamily="50" charset="-128"/>
-                <a:ea typeface="ＭＳ Ｐゴシック" panose="020B0600070205080204" pitchFamily="50" charset="-128"/>
-              </a:rPr>
-              <a:t>オブジェクト指向の表現でも、派生先に矢印を向けるのではなく、元になったクラスやオブジェクトの方に矢印を</a:t>
-            </a:r>
-            <a:r>
-              <a:rPr lang="ja-JP" altLang="en-US" sz="3000" dirty="0" smtClean="0">
-                <a:latin typeface="ＭＳ Ｐゴシック" panose="020B0600070205080204" pitchFamily="50" charset="-128"/>
-                <a:ea typeface="ＭＳ Ｐゴシック" panose="020B0600070205080204" pitchFamily="50" charset="-128"/>
-              </a:rPr>
-              <a:t>向ける（子オブジェクトから親オブジェクトに矢印を向ける</a:t>
-            </a:r>
-            <a:r>
-              <a:rPr lang="en-US" altLang="ja-JP" sz="3000" dirty="0" smtClean="0">
-                <a:latin typeface="ＭＳ Ｐゴシック" panose="020B0600070205080204" pitchFamily="50" charset="-128"/>
-                <a:ea typeface="ＭＳ Ｐゴシック" panose="020B0600070205080204" pitchFamily="50" charset="-128"/>
-              </a:rPr>
-              <a:t>)</a:t>
-            </a:r>
-            <a:r>
-              <a:rPr lang="ja-JP" altLang="en-US" sz="3000" dirty="0" smtClean="0">
-                <a:latin typeface="ＭＳ Ｐゴシック" panose="020B0600070205080204" pitchFamily="50" charset="-128"/>
-                <a:ea typeface="ＭＳ Ｐゴシック" panose="020B0600070205080204" pitchFamily="50" charset="-128"/>
-              </a:rPr>
-              <a:t>図</a:t>
-            </a:r>
-            <a:r>
-              <a:rPr lang="ja-JP" altLang="en-US" sz="3000" dirty="0">
-                <a:latin typeface="ＭＳ Ｐゴシック" panose="020B0600070205080204" pitchFamily="50" charset="-128"/>
-                <a:ea typeface="ＭＳ Ｐゴシック" panose="020B0600070205080204" pitchFamily="50" charset="-128"/>
-              </a:rPr>
-              <a:t>が多い（</a:t>
-            </a:r>
-            <a:r>
-              <a:rPr lang="en-US" altLang="ja-JP" sz="3000" dirty="0">
-                <a:latin typeface="ＭＳ Ｐゴシック" panose="020B0600070205080204" pitchFamily="50" charset="-128"/>
-                <a:ea typeface="ＭＳ Ｐゴシック" panose="020B0600070205080204" pitchFamily="50" charset="-128"/>
-              </a:rPr>
-              <a:t>UML</a:t>
-            </a:r>
-            <a:r>
-              <a:rPr lang="ja-JP" altLang="en-US" sz="3000" dirty="0">
-                <a:latin typeface="ＭＳ Ｐゴシック" panose="020B0600070205080204" pitchFamily="50" charset="-128"/>
-                <a:ea typeface="ＭＳ Ｐゴシック" panose="020B0600070205080204" pitchFamily="50" charset="-128"/>
-              </a:rPr>
-              <a:t>等）</a:t>
-            </a:r>
-            <a:endParaRPr lang="en-US" altLang="ja-JP" sz="3000" dirty="0">
-              <a:latin typeface="ＭＳ Ｐゴシック" panose="020B0600070205080204" pitchFamily="50" charset="-128"/>
-              <a:ea typeface="ＭＳ Ｐゴシック" panose="020B0600070205080204" pitchFamily="50" charset="-128"/>
-            </a:endParaRPr>
-          </a:p>
-          <a:p>
-            <a:pPr marL="457200" indent="-457200">
-              <a:buFont typeface="Arial" panose="020B0604020202020204" pitchFamily="34" charset="0"/>
-              <a:buChar char="•"/>
-            </a:pPr>
-            <a:r>
-              <a:rPr lang="ja-JP" altLang="en-US" sz="3000" dirty="0">
-                <a:latin typeface="ＭＳ Ｐゴシック" panose="020B0600070205080204" pitchFamily="50" charset="-128"/>
-                <a:ea typeface="ＭＳ Ｐゴシック" panose="020B0600070205080204" pitchFamily="50" charset="-128"/>
-              </a:rPr>
-              <a:t>時系列的な</a:t>
-            </a:r>
-            <a:r>
-              <a:rPr lang="en-US" altLang="ja-JP" sz="3000" dirty="0">
-                <a:latin typeface="ＭＳ Ｐゴシック" panose="020B0600070205080204" pitchFamily="50" charset="-128"/>
-                <a:ea typeface="ＭＳ Ｐゴシック" panose="020B0600070205080204" pitchFamily="50" charset="-128"/>
-              </a:rPr>
-              <a:t>Flow</a:t>
-            </a:r>
-            <a:r>
-              <a:rPr lang="ja-JP" altLang="en-US" sz="3000" dirty="0">
-                <a:latin typeface="ＭＳ Ｐゴシック" panose="020B0600070205080204" pitchFamily="50" charset="-128"/>
-                <a:ea typeface="ＭＳ Ｐゴシック" panose="020B0600070205080204" pitchFamily="50" charset="-128"/>
-              </a:rPr>
-              <a:t>とは逆になるので気持ち悪い人もいるかも</a:t>
-            </a:r>
-            <a:endParaRPr lang="en-US" altLang="ja-JP" sz="3000" dirty="0">
-              <a:latin typeface="ＭＳ Ｐゴシック" panose="020B0600070205080204" pitchFamily="50" charset="-128"/>
-              <a:ea typeface="ＭＳ Ｐゴシック" panose="020B0600070205080204" pitchFamily="50" charset="-128"/>
-            </a:endParaRPr>
-          </a:p>
-          <a:p>
-            <a:pPr marL="457200" indent="-457200">
-              <a:buFont typeface="Arial" panose="020B0604020202020204" pitchFamily="34" charset="0"/>
-              <a:buChar char="•"/>
-            </a:pPr>
-            <a:endParaRPr lang="en-US" altLang="ja-JP" sz="3200" dirty="0" smtClean="0"/>
+            <a:endParaRPr lang="en-US" altLang="ja-JP" sz="2800" dirty="0" smtClean="0"/>
           </a:p>
         </p:txBody>
       </p:sp>
@@ -7164,601 +8446,6 @@
     <p:extLst>
       <p:ext uri="{BB962C8B-B14F-4D97-AF65-F5344CB8AC3E}">
         <p14:creationId xmlns:p14="http://schemas.microsoft.com/office/powerpoint/2010/main" val="1213176257"/>
-      </p:ext>
-    </p:extLst>
-  </p:cSld>
-  <p:clrMapOvr>
-    <a:masterClrMapping/>
-  </p:clrMapOvr>
-  <p:timing>
-    <p:tnLst>
-      <p:par>
-        <p:cTn id="1" dur="indefinite" restart="never" nodeType="tmRoot"/>
-      </p:par>
-    </p:tnLst>
-  </p:timing>
-</p:sld>
-</file>
-
-<file path=ppt/slides/slide8.xml><?xml version="1.0" encoding="utf-8"?>
-<p:sld xmlns:a="http://schemas.openxmlformats.org/drawingml/2006/main" xmlns:r="http://schemas.openxmlformats.org/officeDocument/2006/relationships" xmlns:p="http://schemas.openxmlformats.org/presentationml/2006/main">
-  <p:cSld>
-    <p:spTree>
-      <p:nvGrpSpPr>
-        <p:cNvPr id="1" name=""/>
-        <p:cNvGrpSpPr/>
-        <p:nvPr/>
-      </p:nvGrpSpPr>
-      <p:grpSpPr>
-        <a:xfrm>
-          <a:off x="0" y="0"/>
-          <a:ext cx="0" cy="0"/>
-          <a:chOff x="0" y="0"/>
-          <a:chExt cx="0" cy="0"/>
-        </a:xfrm>
-      </p:grpSpPr>
-      <p:sp>
-        <p:nvSpPr>
-          <p:cNvPr id="2" name="タイトル 1"/>
-          <p:cNvSpPr>
-            <a:spLocks noGrp="1"/>
-          </p:cNvSpPr>
-          <p:nvPr>
-            <p:ph type="title"/>
-          </p:nvPr>
-        </p:nvSpPr>
-        <p:spPr/>
-        <p:txBody>
-          <a:bodyPr/>
-          <a:lstStyle/>
-          <a:p>
-            <a:r>
-              <a:rPr kumimoji="1" lang="en-US" altLang="ja-JP" dirty="0" err="1" smtClean="0"/>
-              <a:t>Github</a:t>
-            </a:r>
-            <a:r>
-              <a:rPr kumimoji="1" lang="ja-JP" altLang="en-US" dirty="0" smtClean="0"/>
-              <a:t>とは？</a:t>
-            </a:r>
-            <a:endParaRPr kumimoji="1" lang="ja-JP" altLang="en-US" dirty="0"/>
-          </a:p>
-        </p:txBody>
-      </p:sp>
-      <p:sp>
-        <p:nvSpPr>
-          <p:cNvPr id="3" name="コンテンツ プレースホルダー 2"/>
-          <p:cNvSpPr>
-            <a:spLocks noGrp="1"/>
-          </p:cNvSpPr>
-          <p:nvPr>
-            <p:ph idx="1"/>
-          </p:nvPr>
-        </p:nvSpPr>
-        <p:spPr/>
-        <p:txBody>
-          <a:bodyPr>
-            <a:normAutofit fontScale="92500" lnSpcReduction="10000"/>
-          </a:bodyPr>
-          <a:lstStyle/>
-          <a:p>
-            <a:r>
-              <a:rPr kumimoji="1" lang="en-US" altLang="ja-JP" dirty="0" smtClean="0">
-                <a:hlinkClick r:id="rId2"/>
-              </a:rPr>
-              <a:t>https://github.com</a:t>
-            </a:r>
-            <a:r>
-              <a:rPr kumimoji="1" lang="ja-JP" altLang="en-US" dirty="0" smtClean="0"/>
-              <a:t>にある</a:t>
-            </a:r>
-            <a:r>
-              <a:rPr kumimoji="1" lang="en-US" altLang="ja-JP" dirty="0" err="1" smtClean="0"/>
-              <a:t>Git</a:t>
-            </a:r>
-            <a:r>
-              <a:rPr kumimoji="1" lang="ja-JP" altLang="en-US" dirty="0" smtClean="0"/>
-              <a:t>サーバとしてクラウドサービス</a:t>
-            </a:r>
-            <a:endParaRPr kumimoji="1" lang="en-US" altLang="ja-JP" dirty="0" smtClean="0"/>
-          </a:p>
-          <a:p>
-            <a:pPr lvl="1"/>
-            <a:r>
-              <a:rPr kumimoji="1" lang="ja-JP" altLang="en-US" dirty="0" smtClean="0"/>
-              <a:t>無料</a:t>
-            </a:r>
-            <a:r>
-              <a:rPr kumimoji="1" lang="en-US" altLang="ja-JP" dirty="0" smtClean="0"/>
-              <a:t>/</a:t>
-            </a:r>
-            <a:r>
-              <a:rPr kumimoji="1" lang="ja-JP" altLang="en-US" dirty="0" smtClean="0"/>
-              <a:t>有料のサービスがある</a:t>
-            </a:r>
-            <a:endParaRPr kumimoji="1" lang="en-US" altLang="ja-JP" dirty="0" smtClean="0"/>
-          </a:p>
-          <a:p>
-            <a:pPr lvl="2"/>
-            <a:r>
-              <a:rPr kumimoji="1" lang="ja-JP" altLang="en-US" dirty="0" smtClean="0"/>
-              <a:t>無制限のパブリック</a:t>
-            </a:r>
-            <a:r>
-              <a:rPr kumimoji="1" lang="en-US" altLang="ja-JP" dirty="0" smtClean="0"/>
-              <a:t>(</a:t>
-            </a:r>
-            <a:r>
-              <a:rPr kumimoji="1" lang="ja-JP" altLang="en-US" dirty="0" smtClean="0"/>
-              <a:t>公開</a:t>
-            </a:r>
-            <a:r>
-              <a:rPr kumimoji="1" lang="en-US" altLang="ja-JP" dirty="0" smtClean="0"/>
-              <a:t>)/</a:t>
-            </a:r>
-            <a:r>
-              <a:rPr kumimoji="1" lang="ja-JP" altLang="en-US" dirty="0" smtClean="0"/>
-              <a:t>プライベート</a:t>
-            </a:r>
-            <a:r>
-              <a:rPr kumimoji="1" lang="en-US" altLang="ja-JP" dirty="0" smtClean="0"/>
-              <a:t>(</a:t>
-            </a:r>
-            <a:r>
-              <a:rPr kumimoji="1" lang="ja-JP" altLang="en-US" dirty="0" smtClean="0"/>
-              <a:t>非公開</a:t>
-            </a:r>
-            <a:r>
-              <a:rPr kumimoji="1" lang="en-US" altLang="ja-JP" dirty="0" smtClean="0"/>
-              <a:t>)</a:t>
-            </a:r>
-            <a:r>
-              <a:rPr kumimoji="1" lang="ja-JP" altLang="en-US" dirty="0" smtClean="0"/>
-              <a:t>リポジトリ</a:t>
-            </a:r>
-            <a:endParaRPr kumimoji="1" lang="en-US" altLang="ja-JP" dirty="0" smtClean="0"/>
-          </a:p>
-          <a:p>
-            <a:pPr lvl="2"/>
-            <a:r>
-              <a:rPr kumimoji="1" lang="en-US" altLang="ja-JP" dirty="0" smtClean="0"/>
-              <a:t>Bug</a:t>
-            </a:r>
-            <a:r>
-              <a:rPr kumimoji="1" lang="ja-JP" altLang="en-US" dirty="0" smtClean="0"/>
-              <a:t>トラック、</a:t>
-            </a:r>
-            <a:r>
-              <a:rPr kumimoji="1" lang="en-US" altLang="ja-JP" dirty="0" smtClean="0"/>
-              <a:t>Issue</a:t>
-            </a:r>
-            <a:r>
-              <a:rPr kumimoji="1" lang="ja-JP" altLang="en-US" dirty="0" smtClean="0"/>
-              <a:t>作成、プロジェクト管理</a:t>
-            </a:r>
-            <a:endParaRPr kumimoji="1" lang="en-US" altLang="ja-JP" dirty="0" smtClean="0"/>
-          </a:p>
-          <a:p>
-            <a:pPr lvl="2"/>
-            <a:r>
-              <a:rPr lang="ja-JP" altLang="en-US" dirty="0" smtClean="0"/>
-              <a:t>無料サービス</a:t>
-            </a:r>
-            <a:endParaRPr lang="en-US" altLang="ja-JP" dirty="0" smtClean="0"/>
-          </a:p>
-          <a:p>
-            <a:pPr lvl="3"/>
-            <a:r>
-              <a:rPr lang="ja-JP" altLang="en-US" dirty="0" smtClean="0"/>
-              <a:t>プライベートリポジトリのコラボレータ</a:t>
-            </a:r>
-            <a:r>
-              <a:rPr lang="en-US" altLang="ja-JP" dirty="0" smtClean="0"/>
-              <a:t>(</a:t>
-            </a:r>
-            <a:r>
-              <a:rPr lang="ja-JP" altLang="en-US" dirty="0" smtClean="0"/>
-              <a:t>共同開発者</a:t>
-            </a:r>
-            <a:r>
-              <a:rPr lang="en-US" altLang="ja-JP" dirty="0" smtClean="0"/>
-              <a:t>)</a:t>
-            </a:r>
-            <a:r>
-              <a:rPr lang="ja-JP" altLang="en-US" dirty="0" smtClean="0"/>
-              <a:t>数が</a:t>
-            </a:r>
-            <a:r>
-              <a:rPr lang="en-US" altLang="ja-JP" dirty="0" smtClean="0"/>
-              <a:t>3</a:t>
-            </a:r>
-            <a:r>
-              <a:rPr lang="ja-JP" altLang="en-US" dirty="0" smtClean="0"/>
-              <a:t>人まで</a:t>
-            </a:r>
-            <a:endParaRPr lang="en-US" altLang="ja-JP" dirty="0" smtClean="0"/>
-          </a:p>
-          <a:p>
-            <a:pPr lvl="2"/>
-            <a:r>
-              <a:rPr lang="ja-JP" altLang="en-US" dirty="0" smtClean="0"/>
-              <a:t>有料サービス</a:t>
-            </a:r>
-            <a:endParaRPr lang="en-US" altLang="ja-JP" dirty="0" smtClean="0"/>
-          </a:p>
-          <a:p>
-            <a:pPr lvl="3"/>
-            <a:r>
-              <a:rPr lang="ja-JP" altLang="en-US" dirty="0" smtClean="0"/>
-              <a:t>プライベートリポジトリのコラボレータ数の制限なし</a:t>
-            </a:r>
-            <a:endParaRPr lang="en-US" altLang="ja-JP" dirty="0" smtClean="0"/>
-          </a:p>
-          <a:p>
-            <a:pPr lvl="3"/>
-            <a:r>
-              <a:rPr lang="en-US" altLang="ja-JP" dirty="0" smtClean="0"/>
-              <a:t>PRO</a:t>
-            </a:r>
-            <a:r>
-              <a:rPr lang="ja-JP" altLang="en-US" dirty="0" smtClean="0"/>
-              <a:t>　</a:t>
-            </a:r>
-            <a:r>
-              <a:rPr lang="en-US" altLang="ja-JP" dirty="0" smtClean="0"/>
-              <a:t>($7/mon)</a:t>
-            </a:r>
-          </a:p>
-          <a:p>
-            <a:pPr lvl="4"/>
-            <a:r>
-              <a:rPr lang="en-US" altLang="ja-JP" dirty="0" smtClean="0"/>
-              <a:t>pages</a:t>
-            </a:r>
-            <a:r>
-              <a:rPr lang="ja-JP" altLang="en-US" dirty="0" err="1" smtClean="0"/>
-              <a:t>、</a:t>
-            </a:r>
-            <a:r>
-              <a:rPr lang="en-US" altLang="ja-JP" dirty="0" smtClean="0"/>
-              <a:t>Wiki</a:t>
-            </a:r>
-            <a:r>
-              <a:rPr lang="ja-JP" altLang="en-US" dirty="0" err="1" smtClean="0"/>
-              <a:t>、</a:t>
-            </a:r>
-            <a:r>
-              <a:rPr lang="ja-JP" altLang="en-US" dirty="0" smtClean="0"/>
-              <a:t>ブランチの保護、コードオーナー、</a:t>
-            </a:r>
-            <a:r>
-              <a:rPr lang="en-US" altLang="ja-JP" dirty="0" smtClean="0"/>
-              <a:t>Insight</a:t>
-            </a:r>
-            <a:r>
-              <a:rPr lang="ja-JP" altLang="en-US" dirty="0" smtClean="0"/>
-              <a:t>などの機能</a:t>
-            </a:r>
-            <a:endParaRPr lang="en-US" altLang="ja-JP" dirty="0" smtClean="0"/>
-          </a:p>
-          <a:p>
-            <a:pPr lvl="3"/>
-            <a:r>
-              <a:rPr lang="en-US" altLang="ja-JP" dirty="0" smtClean="0"/>
-              <a:t>Team ($7/mon/user)</a:t>
-            </a:r>
-          </a:p>
-          <a:p>
-            <a:pPr lvl="4"/>
-            <a:r>
-              <a:rPr lang="en-US" altLang="ja-JP" dirty="0" smtClean="0"/>
-              <a:t>Pro</a:t>
-            </a:r>
-            <a:r>
-              <a:rPr lang="ja-JP" altLang="en-US" dirty="0" smtClean="0"/>
-              <a:t>の機能</a:t>
-            </a:r>
-            <a:r>
-              <a:rPr lang="en-US" altLang="ja-JP" dirty="0" smtClean="0"/>
-              <a:t>+</a:t>
-            </a:r>
-            <a:r>
-              <a:rPr lang="ja-JP" altLang="en-US" dirty="0" smtClean="0"/>
-              <a:t>チームごとのアクセス管理、ユーザ管理</a:t>
-            </a:r>
-            <a:endParaRPr lang="en-US" altLang="ja-JP" dirty="0" smtClean="0"/>
-          </a:p>
-          <a:p>
-            <a:pPr lvl="3"/>
-            <a:r>
-              <a:rPr lang="en-US" altLang="ja-JP" dirty="0" smtClean="0"/>
-              <a:t>Enterprise($21/mon/user)</a:t>
-            </a:r>
-          </a:p>
-          <a:p>
-            <a:pPr lvl="4"/>
-            <a:r>
-              <a:rPr lang="en-US" altLang="ja-JP" dirty="0" smtClean="0"/>
-              <a:t>Team+</a:t>
-            </a:r>
-            <a:r>
-              <a:rPr lang="ja-JP" altLang="en-US" dirty="0" smtClean="0"/>
-              <a:t>オンプレミスとクラウド、</a:t>
-            </a:r>
-            <a:r>
-              <a:rPr lang="en-US" altLang="ja-JP" dirty="0" smtClean="0"/>
-              <a:t>SAML</a:t>
-            </a:r>
-            <a:r>
-              <a:rPr lang="ja-JP" altLang="en-US" dirty="0" smtClean="0"/>
-              <a:t>シングルサインオン、アクセスプロビジョニング、稼働率</a:t>
-            </a:r>
-            <a:r>
-              <a:rPr lang="en-US" altLang="ja-JP" dirty="0" smtClean="0"/>
-              <a:t>SLA</a:t>
-            </a:r>
-            <a:r>
-              <a:rPr lang="ja-JP" altLang="en-US" dirty="0" err="1" smtClean="0"/>
-              <a:t>、</a:t>
-            </a:r>
-            <a:r>
-              <a:rPr lang="ja-JP" altLang="en-US" dirty="0" smtClean="0"/>
-              <a:t>請求書発行、監査機能等</a:t>
-            </a:r>
-            <a:endParaRPr lang="en-US" altLang="ja-JP" dirty="0"/>
-          </a:p>
-          <a:p>
-            <a:pPr lvl="1"/>
-            <a:endParaRPr kumimoji="1" lang="ja-JP" altLang="en-US" dirty="0"/>
-          </a:p>
-        </p:txBody>
-      </p:sp>
-      <p:sp>
-        <p:nvSpPr>
-          <p:cNvPr id="4" name="Rectangle 1"/>
-          <p:cNvSpPr>
-            <a:spLocks noChangeArrowheads="1"/>
-          </p:cNvSpPr>
-          <p:nvPr/>
-        </p:nvSpPr>
-        <p:spPr bwMode="auto">
-          <a:xfrm>
-            <a:off x="0" y="0"/>
-            <a:ext cx="12192000" cy="0"/>
-          </a:xfrm>
-          <a:prstGeom prst="rect">
-            <a:avLst/>
-          </a:prstGeom>
-          <a:solidFill>
-            <a:srgbClr val="032F62"/>
-          </a:solidFill>
-          <a:ln>
-            <a:noFill/>
-          </a:ln>
-          <a:effectLst/>
-          <a:extLst>
-            <a:ext uri="{91240B29-F687-4F45-9708-019B960494DF}">
-              <a14:hiddenLine xmlns:a14="http://schemas.microsoft.com/office/drawing/2010/main" w="9525">
-                <a:solidFill>
-                  <a:schemeClr val="tx1"/>
-                </a:solidFill>
-                <a:miter lim="800000"/>
-                <a:headEnd/>
-                <a:tailEnd/>
-              </a14:hiddenLine>
-            </a:ext>
-            <a:ext uri="{AF507438-7753-43E0-B8FC-AC1667EBCBE1}">
-              <a14:hiddenEffects xmlns:a14="http://schemas.microsoft.com/office/drawing/2010/main">
-                <a:effectLst>
-                  <a:outerShdw dist="35921" dir="2700000" algn="ctr" rotWithShape="0">
-                    <a:schemeClr val="bg2"/>
-                  </a:outerShdw>
-                </a:effectLst>
-              </a14:hiddenEffects>
-            </a:ext>
-          </a:extLst>
-        </p:spPr>
-        <p:txBody>
-          <a:bodyPr vert="horz" wrap="none" lIns="91440" tIns="46023" rIns="91440" bIns="92046" numCol="1" anchor="ctr" anchorCtr="0" compatLnSpc="1">
-            <a:prstTxWarp prst="textNoShape">
-              <a:avLst/>
-            </a:prstTxWarp>
-            <a:spAutoFit/>
-          </a:bodyPr>
-          <a:lstStyle/>
-          <a:p>
-            <a:pPr marL="0" marR="0" lvl="0" indent="0" algn="l" defTabSz="914400" rtl="0" eaLnBrk="0" fontAlgn="base" latinLnBrk="0" hangingPunct="0">
-              <a:lnSpc>
-                <a:spcPct val="100000"/>
-              </a:lnSpc>
-              <a:spcBef>
-                <a:spcPct val="0"/>
-              </a:spcBef>
-              <a:spcAft>
-                <a:spcPct val="0"/>
-              </a:spcAft>
-              <a:buClrTx/>
-              <a:buSzTx/>
-              <a:buFontTx/>
-              <a:buNone/>
-              <a:tabLst/>
-            </a:pPr>
-            <a:endParaRPr kumimoji="0" lang="ja-JP" altLang="ja-JP" sz="1800" b="0" i="0" u="none" strike="noStrike" cap="none" normalizeH="0" baseline="0" smtClean="0">
-              <a:ln>
-                <a:noFill/>
-              </a:ln>
-              <a:solidFill>
-                <a:schemeClr val="tx1"/>
-              </a:solidFill>
-              <a:effectLst/>
-              <a:latin typeface="Arial" panose="020B0604020202020204" pitchFamily="34" charset="0"/>
-            </a:endParaRPr>
-          </a:p>
-          <a:p>
-            <a:pPr marL="0" marR="0" lvl="0" indent="0" algn="l" defTabSz="914400" rtl="0" eaLnBrk="0" fontAlgn="base" latinLnBrk="0" hangingPunct="0">
-              <a:lnSpc>
-                <a:spcPct val="100000"/>
-              </a:lnSpc>
-              <a:spcBef>
-                <a:spcPct val="0"/>
-              </a:spcBef>
-              <a:spcAft>
-                <a:spcPct val="0"/>
-              </a:spcAft>
-              <a:buClrTx/>
-              <a:buSzTx/>
-              <a:buFontTx/>
-              <a:buChar char="•"/>
-              <a:tabLst/>
-            </a:pPr>
-            <a:r>
-              <a:rPr kumimoji="0" lang="ja-JP" altLang="ja-JP" sz="1000" b="0" i="0" u="none" strike="noStrike" cap="none" normalizeH="0" baseline="0" smtClean="0">
-                <a:ln>
-                  <a:noFill/>
-                </a:ln>
-                <a:solidFill>
-                  <a:srgbClr val="FFFFFF"/>
-                </a:solidFill>
-                <a:effectLst/>
-                <a:latin typeface="Arial" panose="020B0604020202020204" pitchFamily="34" charset="0"/>
-                <a:ea typeface="-apple-system"/>
-              </a:rPr>
-              <a:t>チームごとのアクセス管理</a:t>
-            </a:r>
-          </a:p>
-          <a:p>
-            <a:pPr marL="0" marR="0" lvl="0" indent="0" algn="l" defTabSz="914400" rtl="0" eaLnBrk="0" fontAlgn="base" latinLnBrk="0" hangingPunct="0">
-              <a:lnSpc>
-                <a:spcPct val="100000"/>
-              </a:lnSpc>
-              <a:spcBef>
-                <a:spcPct val="0"/>
-              </a:spcBef>
-              <a:spcAft>
-                <a:spcPct val="0"/>
-              </a:spcAft>
-              <a:buClrTx/>
-              <a:buSzTx/>
-              <a:buFontTx/>
-              <a:buChar char="•"/>
-              <a:tabLst/>
-            </a:pPr>
-            <a:r>
-              <a:rPr kumimoji="0" lang="ja-JP" altLang="ja-JP" sz="1000" b="0" i="0" u="none" strike="noStrike" cap="none" normalizeH="0" baseline="0" smtClean="0">
-                <a:ln>
-                  <a:noFill/>
-                </a:ln>
-                <a:solidFill>
-                  <a:srgbClr val="FFFFFF"/>
-                </a:solidFill>
-                <a:effectLst/>
-                <a:latin typeface="Arial" panose="020B0604020202020204" pitchFamily="34" charset="0"/>
-                <a:ea typeface="-apple-system"/>
-              </a:rPr>
-              <a:t>  </a:t>
-            </a:r>
-            <a:r>
-              <a:rPr kumimoji="0" lang="ja-JP" altLang="ja-JP" sz="1900" b="0" i="0" u="none" strike="noStrike" cap="none" normalizeH="0" baseline="0" smtClean="0">
-                <a:ln>
-                  <a:noFill/>
-                </a:ln>
-                <a:solidFill>
-                  <a:srgbClr val="FFFFFF"/>
-                </a:solidFill>
-                <a:effectLst/>
-                <a:latin typeface="Arial" panose="020B0604020202020204" pitchFamily="34" charset="0"/>
-                <a:ea typeface="-apple-system"/>
-              </a:rPr>
-              <a:t>ユ</a:t>
-            </a:r>
-            <a:r>
-              <a:rPr kumimoji="0" lang="ja-JP" altLang="ja-JP" sz="1000" b="0" i="0" u="none" strike="noStrike" cap="none" normalizeH="0" baseline="0" smtClean="0">
-                <a:ln>
-                  <a:noFill/>
-                </a:ln>
-                <a:solidFill>
-                  <a:srgbClr val="FFFFFF"/>
-                </a:solidFill>
-                <a:effectLst/>
-                <a:latin typeface="Arial" panose="020B0604020202020204" pitchFamily="34" charset="0"/>
-                <a:ea typeface="-apple-system"/>
-              </a:rPr>
-              <a:t>ーザー管理</a:t>
-            </a:r>
-          </a:p>
-          <a:p>
-            <a:pPr marL="0" marR="0" lvl="0" indent="0" algn="l" defTabSz="914400" rtl="0" eaLnBrk="0" fontAlgn="base" latinLnBrk="0" hangingPunct="0">
-              <a:lnSpc>
-                <a:spcPct val="100000"/>
-              </a:lnSpc>
-              <a:spcBef>
-                <a:spcPct val="0"/>
-              </a:spcBef>
-              <a:spcAft>
-                <a:spcPct val="0"/>
-              </a:spcAft>
-              <a:buClrTx/>
-              <a:buSzTx/>
-              <a:buFontTx/>
-              <a:buNone/>
-              <a:tabLst/>
-            </a:pPr>
-            <a:endParaRPr kumimoji="0" lang="ja-JP" altLang="ja-JP" sz="1000" b="0" i="0" u="none" strike="noStrike" cap="none" normalizeH="0" baseline="0" smtClean="0">
-              <a:ln>
-                <a:noFill/>
-              </a:ln>
-              <a:solidFill>
-                <a:srgbClr val="FFFFFF"/>
-              </a:solidFill>
-              <a:effectLst/>
-              <a:latin typeface="Arial" panose="020B0604020202020204" pitchFamily="34" charset="0"/>
-              <a:ea typeface="-apple-system"/>
-            </a:endParaRPr>
-          </a:p>
-        </p:txBody>
-      </p:sp>
-      <p:sp>
-        <p:nvSpPr>
-          <p:cNvPr id="5" name="AutoShape 2" descr="✓"/>
-          <p:cNvSpPr>
-            <a:spLocks noChangeAspect="1" noChangeArrowheads="1"/>
-          </p:cNvSpPr>
-          <p:nvPr/>
-        </p:nvSpPr>
-        <p:spPr bwMode="auto">
-          <a:xfrm>
-            <a:off x="79375" y="-6350"/>
-            <a:ext cx="304800" cy="304800"/>
-          </a:xfrm>
-          <a:prstGeom prst="rect">
-            <a:avLst/>
-          </a:prstGeom>
-          <a:noFill/>
-          <a:extLst>
-            <a:ext uri="{909E8E84-426E-40DD-AFC4-6F175D3DCCD1}">
-              <a14:hiddenFill xmlns:a14="http://schemas.microsoft.com/office/drawing/2010/main">
-                <a:solidFill>
-                  <a:srgbClr val="FFFFFF"/>
-                </a:solidFill>
-              </a14:hiddenFill>
-            </a:ext>
-          </a:extLst>
-        </p:spPr>
-        <p:txBody>
-          <a:bodyPr vert="horz" wrap="square" lIns="91440" tIns="45720" rIns="91440" bIns="45720" numCol="1" anchor="t" anchorCtr="0" compatLnSpc="1">
-            <a:prstTxWarp prst="textNoShape">
-              <a:avLst/>
-            </a:prstTxWarp>
-          </a:bodyPr>
-          <a:lstStyle/>
-          <a:p>
-            <a:endParaRPr lang="ja-JP" altLang="en-US"/>
-          </a:p>
-        </p:txBody>
-      </p:sp>
-    </p:spTree>
-    <p:extLst>
-      <p:ext uri="{BB962C8B-B14F-4D97-AF65-F5344CB8AC3E}">
-        <p14:creationId xmlns:p14="http://schemas.microsoft.com/office/powerpoint/2010/main" val="2295600838"/>
       </p:ext>
     </p:extLst>
   </p:cSld>
@@ -7794,1039 +8481,566 @@
       </p:grpSpPr>
       <p:sp>
         <p:nvSpPr>
-          <p:cNvPr id="4" name="円/楕円 3"/>
-          <p:cNvSpPr/>
+          <p:cNvPr id="2" name="タイトル 1"/>
+          <p:cNvSpPr>
+            <a:spLocks noGrp="1"/>
+          </p:cNvSpPr>
+          <p:nvPr>
+            <p:ph type="title"/>
+          </p:nvPr>
+        </p:nvSpPr>
+        <p:spPr/>
+        <p:txBody>
+          <a:bodyPr/>
+          <a:lstStyle/>
+          <a:p>
+            <a:r>
+              <a:rPr kumimoji="1" lang="en-US" altLang="ja-JP" dirty="0" err="1" smtClean="0"/>
+              <a:t>Github</a:t>
+            </a:r>
+            <a:r>
+              <a:rPr kumimoji="1" lang="ja-JP" altLang="en-US" dirty="0" smtClean="0"/>
+              <a:t>とは？</a:t>
+            </a:r>
+            <a:endParaRPr kumimoji="1" lang="ja-JP" altLang="en-US" dirty="0"/>
+          </a:p>
+        </p:txBody>
+      </p:sp>
+      <p:sp>
+        <p:nvSpPr>
+          <p:cNvPr id="3" name="コンテンツ プレースホルダー 2"/>
+          <p:cNvSpPr>
+            <a:spLocks noGrp="1"/>
+          </p:cNvSpPr>
+          <p:nvPr>
+            <p:ph idx="1"/>
+          </p:nvPr>
+        </p:nvSpPr>
+        <p:spPr/>
+        <p:txBody>
+          <a:bodyPr>
+            <a:normAutofit fontScale="92500" lnSpcReduction="10000"/>
+          </a:bodyPr>
+          <a:lstStyle/>
+          <a:p>
+            <a:r>
+              <a:rPr kumimoji="1" lang="en-US" altLang="ja-JP" dirty="0" smtClean="0">
+                <a:hlinkClick r:id="rId2"/>
+              </a:rPr>
+              <a:t>https://github.com</a:t>
+            </a:r>
+            <a:r>
+              <a:rPr kumimoji="1" lang="ja-JP" altLang="en-US" dirty="0" smtClean="0"/>
+              <a:t>にある</a:t>
+            </a:r>
+            <a:r>
+              <a:rPr kumimoji="1" lang="en-US" altLang="ja-JP" dirty="0" err="1" smtClean="0"/>
+              <a:t>Git</a:t>
+            </a:r>
+            <a:r>
+              <a:rPr kumimoji="1" lang="ja-JP" altLang="en-US" dirty="0" smtClean="0"/>
+              <a:t>サーバとしてクラウドサービス</a:t>
+            </a:r>
+            <a:endParaRPr kumimoji="1" lang="en-US" altLang="ja-JP" dirty="0" smtClean="0"/>
+          </a:p>
+          <a:p>
+            <a:pPr lvl="1"/>
+            <a:r>
+              <a:rPr kumimoji="1" lang="ja-JP" altLang="en-US" dirty="0" smtClean="0"/>
+              <a:t>無料</a:t>
+            </a:r>
+            <a:r>
+              <a:rPr kumimoji="1" lang="en-US" altLang="ja-JP" dirty="0" smtClean="0"/>
+              <a:t>/</a:t>
+            </a:r>
+            <a:r>
+              <a:rPr kumimoji="1" lang="ja-JP" altLang="en-US" dirty="0" smtClean="0"/>
+              <a:t>有料のサービスがある</a:t>
+            </a:r>
+            <a:endParaRPr kumimoji="1" lang="en-US" altLang="ja-JP" dirty="0" smtClean="0"/>
+          </a:p>
+          <a:p>
+            <a:pPr lvl="2"/>
+            <a:r>
+              <a:rPr kumimoji="1" lang="ja-JP" altLang="en-US" dirty="0" smtClean="0"/>
+              <a:t>無制限のパブリック</a:t>
+            </a:r>
+            <a:r>
+              <a:rPr kumimoji="1" lang="en-US" altLang="ja-JP" dirty="0" smtClean="0"/>
+              <a:t>(</a:t>
+            </a:r>
+            <a:r>
+              <a:rPr kumimoji="1" lang="ja-JP" altLang="en-US" dirty="0" smtClean="0"/>
+              <a:t>公開</a:t>
+            </a:r>
+            <a:r>
+              <a:rPr kumimoji="1" lang="en-US" altLang="ja-JP" dirty="0" smtClean="0"/>
+              <a:t>)/</a:t>
+            </a:r>
+            <a:r>
+              <a:rPr kumimoji="1" lang="ja-JP" altLang="en-US" dirty="0" smtClean="0"/>
+              <a:t>プライベート</a:t>
+            </a:r>
+            <a:r>
+              <a:rPr kumimoji="1" lang="en-US" altLang="ja-JP" dirty="0" smtClean="0"/>
+              <a:t>(</a:t>
+            </a:r>
+            <a:r>
+              <a:rPr kumimoji="1" lang="ja-JP" altLang="en-US" dirty="0" smtClean="0"/>
+              <a:t>非公開</a:t>
+            </a:r>
+            <a:r>
+              <a:rPr kumimoji="1" lang="en-US" altLang="ja-JP" dirty="0" smtClean="0"/>
+              <a:t>)</a:t>
+            </a:r>
+            <a:r>
+              <a:rPr kumimoji="1" lang="ja-JP" altLang="en-US" dirty="0" smtClean="0"/>
+              <a:t>リポジトリ</a:t>
+            </a:r>
+            <a:endParaRPr kumimoji="1" lang="en-US" altLang="ja-JP" dirty="0" smtClean="0"/>
+          </a:p>
+          <a:p>
+            <a:pPr lvl="2"/>
+            <a:r>
+              <a:rPr kumimoji="1" lang="en-US" altLang="ja-JP" dirty="0" smtClean="0"/>
+              <a:t>Bug</a:t>
+            </a:r>
+            <a:r>
+              <a:rPr kumimoji="1" lang="ja-JP" altLang="en-US" dirty="0" smtClean="0"/>
+              <a:t>トラック、</a:t>
+            </a:r>
+            <a:r>
+              <a:rPr kumimoji="1" lang="en-US" altLang="ja-JP" dirty="0" smtClean="0"/>
+              <a:t>Issue</a:t>
+            </a:r>
+            <a:r>
+              <a:rPr kumimoji="1" lang="ja-JP" altLang="en-US" dirty="0" smtClean="0"/>
+              <a:t>作成、プロジェクト管理</a:t>
+            </a:r>
+            <a:endParaRPr kumimoji="1" lang="en-US" altLang="ja-JP" dirty="0" smtClean="0"/>
+          </a:p>
+          <a:p>
+            <a:pPr lvl="2"/>
+            <a:r>
+              <a:rPr lang="ja-JP" altLang="en-US" dirty="0" smtClean="0"/>
+              <a:t>無料サービス</a:t>
+            </a:r>
+            <a:endParaRPr lang="en-US" altLang="ja-JP" dirty="0" smtClean="0"/>
+          </a:p>
+          <a:p>
+            <a:pPr lvl="3"/>
+            <a:r>
+              <a:rPr lang="ja-JP" altLang="en-US" dirty="0" smtClean="0"/>
+              <a:t>プライベートリポジトリのコラボレータ</a:t>
+            </a:r>
+            <a:r>
+              <a:rPr lang="en-US" altLang="ja-JP" dirty="0" smtClean="0"/>
+              <a:t>(</a:t>
+            </a:r>
+            <a:r>
+              <a:rPr lang="ja-JP" altLang="en-US" dirty="0" smtClean="0"/>
+              <a:t>共同開発者</a:t>
+            </a:r>
+            <a:r>
+              <a:rPr lang="en-US" altLang="ja-JP" dirty="0" smtClean="0"/>
+              <a:t>)</a:t>
+            </a:r>
+            <a:r>
+              <a:rPr lang="ja-JP" altLang="en-US" dirty="0" smtClean="0"/>
+              <a:t>数が</a:t>
+            </a:r>
+            <a:r>
+              <a:rPr lang="en-US" altLang="ja-JP" dirty="0" smtClean="0"/>
+              <a:t>3</a:t>
+            </a:r>
+            <a:r>
+              <a:rPr lang="ja-JP" altLang="en-US" dirty="0" smtClean="0"/>
+              <a:t>人まで</a:t>
+            </a:r>
+            <a:endParaRPr lang="en-US" altLang="ja-JP" dirty="0" smtClean="0"/>
+          </a:p>
+          <a:p>
+            <a:pPr lvl="2"/>
+            <a:r>
+              <a:rPr lang="ja-JP" altLang="en-US" dirty="0" smtClean="0"/>
+              <a:t>有料サービス</a:t>
+            </a:r>
+            <a:endParaRPr lang="en-US" altLang="ja-JP" dirty="0" smtClean="0"/>
+          </a:p>
+          <a:p>
+            <a:pPr lvl="3"/>
+            <a:r>
+              <a:rPr lang="ja-JP" altLang="en-US" dirty="0" smtClean="0"/>
+              <a:t>プライベートリポジトリのコラボレータ数の制限なし</a:t>
+            </a:r>
+            <a:endParaRPr lang="en-US" altLang="ja-JP" dirty="0" smtClean="0"/>
+          </a:p>
+          <a:p>
+            <a:pPr lvl="3"/>
+            <a:r>
+              <a:rPr lang="en-US" altLang="ja-JP" dirty="0" smtClean="0"/>
+              <a:t>PRO</a:t>
+            </a:r>
+            <a:r>
+              <a:rPr lang="ja-JP" altLang="en-US" dirty="0" smtClean="0"/>
+              <a:t>　</a:t>
+            </a:r>
+            <a:r>
+              <a:rPr lang="en-US" altLang="ja-JP" dirty="0" smtClean="0"/>
+              <a:t>($7/mon)</a:t>
+            </a:r>
+          </a:p>
+          <a:p>
+            <a:pPr lvl="4"/>
+            <a:r>
+              <a:rPr lang="en-US" altLang="ja-JP" dirty="0" smtClean="0"/>
+              <a:t>pages</a:t>
+            </a:r>
+            <a:r>
+              <a:rPr lang="ja-JP" altLang="en-US" dirty="0" err="1" smtClean="0"/>
+              <a:t>、</a:t>
+            </a:r>
+            <a:r>
+              <a:rPr lang="en-US" altLang="ja-JP" dirty="0" smtClean="0"/>
+              <a:t>Wiki</a:t>
+            </a:r>
+            <a:r>
+              <a:rPr lang="ja-JP" altLang="en-US" dirty="0" err="1" smtClean="0"/>
+              <a:t>、</a:t>
+            </a:r>
+            <a:r>
+              <a:rPr lang="ja-JP" altLang="en-US" dirty="0" smtClean="0"/>
+              <a:t>ブランチの保護、コードオーナー、</a:t>
+            </a:r>
+            <a:r>
+              <a:rPr lang="en-US" altLang="ja-JP" dirty="0" smtClean="0"/>
+              <a:t>Insight</a:t>
+            </a:r>
+            <a:r>
+              <a:rPr lang="ja-JP" altLang="en-US" dirty="0" smtClean="0"/>
+              <a:t>などの機能</a:t>
+            </a:r>
+            <a:endParaRPr lang="en-US" altLang="ja-JP" dirty="0" smtClean="0"/>
+          </a:p>
+          <a:p>
+            <a:pPr lvl="3"/>
+            <a:r>
+              <a:rPr lang="en-US" altLang="ja-JP" dirty="0" smtClean="0"/>
+              <a:t>Team ($7/mon/user)</a:t>
+            </a:r>
+          </a:p>
+          <a:p>
+            <a:pPr lvl="4"/>
+            <a:r>
+              <a:rPr lang="en-US" altLang="ja-JP" dirty="0" smtClean="0"/>
+              <a:t>Pro</a:t>
+            </a:r>
+            <a:r>
+              <a:rPr lang="ja-JP" altLang="en-US" dirty="0" smtClean="0"/>
+              <a:t>の機能</a:t>
+            </a:r>
+            <a:r>
+              <a:rPr lang="en-US" altLang="ja-JP" dirty="0" smtClean="0"/>
+              <a:t>+</a:t>
+            </a:r>
+            <a:r>
+              <a:rPr lang="ja-JP" altLang="en-US" dirty="0" smtClean="0"/>
+              <a:t>チームごとのアクセス管理、ユーザ管理</a:t>
+            </a:r>
+            <a:endParaRPr lang="en-US" altLang="ja-JP" dirty="0" smtClean="0"/>
+          </a:p>
+          <a:p>
+            <a:pPr lvl="3"/>
+            <a:r>
+              <a:rPr lang="en-US" altLang="ja-JP" dirty="0" smtClean="0"/>
+              <a:t>Enterprise($21/mon/user)</a:t>
+            </a:r>
+          </a:p>
+          <a:p>
+            <a:pPr lvl="4"/>
+            <a:r>
+              <a:rPr lang="en-US" altLang="ja-JP" dirty="0" smtClean="0"/>
+              <a:t>Team+</a:t>
+            </a:r>
+            <a:r>
+              <a:rPr lang="ja-JP" altLang="en-US" dirty="0" smtClean="0"/>
+              <a:t>オンプレミスとクラウド、</a:t>
+            </a:r>
+            <a:r>
+              <a:rPr lang="en-US" altLang="ja-JP" dirty="0" smtClean="0"/>
+              <a:t>SAML</a:t>
+            </a:r>
+            <a:r>
+              <a:rPr lang="ja-JP" altLang="en-US" dirty="0" smtClean="0"/>
+              <a:t>シングルサインオン、アクセスプロビジョニング、稼働率</a:t>
+            </a:r>
+            <a:r>
+              <a:rPr lang="en-US" altLang="ja-JP" dirty="0" smtClean="0"/>
+              <a:t>SLA</a:t>
+            </a:r>
+            <a:r>
+              <a:rPr lang="ja-JP" altLang="en-US" dirty="0" err="1" smtClean="0"/>
+              <a:t>、</a:t>
+            </a:r>
+            <a:r>
+              <a:rPr lang="ja-JP" altLang="en-US" dirty="0" smtClean="0"/>
+              <a:t>請求書発行、監査機能等</a:t>
+            </a:r>
+            <a:endParaRPr lang="en-US" altLang="ja-JP" dirty="0"/>
+          </a:p>
+          <a:p>
+            <a:pPr lvl="1"/>
+            <a:endParaRPr kumimoji="1" lang="ja-JP" altLang="en-US" dirty="0"/>
+          </a:p>
+        </p:txBody>
+      </p:sp>
+      <p:sp>
+        <p:nvSpPr>
+          <p:cNvPr id="4" name="Rectangle 1"/>
+          <p:cNvSpPr>
+            <a:spLocks noChangeArrowheads="1"/>
+          </p:cNvSpPr>
           <p:nvPr/>
         </p:nvSpPr>
-        <p:spPr>
+        <p:spPr bwMode="auto">
           <a:xfrm>
-            <a:off x="1767562" y="968515"/>
-            <a:ext cx="9916886" cy="3787446"/>
-          </a:xfrm>
-          <a:prstGeom prst="ellipse">
+            <a:off x="0" y="0"/>
+            <a:ext cx="12192000" cy="0"/>
+          </a:xfrm>
+          <a:prstGeom prst="rect">
             <a:avLst/>
           </a:prstGeom>
           <a:solidFill>
-            <a:schemeClr val="accent4">
-              <a:lumMod val="40000"/>
-              <a:lumOff val="60000"/>
-            </a:schemeClr>
+            <a:srgbClr val="032F62"/>
           </a:solidFill>
-        </p:spPr>
-        <p:style>
-          <a:lnRef idx="2">
-            <a:schemeClr val="accent1">
-              <a:shade val="50000"/>
-            </a:schemeClr>
-          </a:lnRef>
-          <a:fillRef idx="1">
-            <a:schemeClr val="accent1"/>
-          </a:fillRef>
-          <a:effectRef idx="0">
-            <a:schemeClr val="accent1"/>
-          </a:effectRef>
-          <a:fontRef idx="minor">
-            <a:schemeClr val="lt1"/>
-          </a:fontRef>
-        </p:style>
-        <p:txBody>
-          <a:bodyPr rtlCol="0" anchor="ctr"/>
-          <a:lstStyle/>
-          <a:p>
-            <a:pPr algn="ctr"/>
-            <a:endParaRPr kumimoji="1" lang="ja-JP" altLang="en-US"/>
-          </a:p>
-        </p:txBody>
-      </p:sp>
-      <p:sp>
-        <p:nvSpPr>
-          <p:cNvPr id="5" name="タイトル 1"/>
-          <p:cNvSpPr txBox="1">
-            <a:spLocks/>
-          </p:cNvSpPr>
-          <p:nvPr/>
-        </p:nvSpPr>
-        <p:spPr>
-          <a:xfrm>
-            <a:off x="838200" y="365126"/>
-            <a:ext cx="7086600" cy="731606"/>
-          </a:xfrm>
-          <a:prstGeom prst="rect">
-            <a:avLst/>
-          </a:prstGeom>
-        </p:spPr>
-        <p:txBody>
-          <a:bodyPr vert="horz" lIns="91440" tIns="45720" rIns="91440" bIns="45720" rtlCol="0" anchor="ctr">
-            <a:normAutofit/>
+          <a:ln>
+            <a:noFill/>
+          </a:ln>
+          <a:effectLst/>
+          <a:extLst>
+            <a:ext uri="{91240B29-F687-4F45-9708-019B960494DF}">
+              <a14:hiddenLine xmlns:a14="http://schemas.microsoft.com/office/drawing/2010/main" w="9525">
+                <a:solidFill>
+                  <a:schemeClr val="tx1"/>
+                </a:solidFill>
+                <a:miter lim="800000"/>
+                <a:headEnd/>
+                <a:tailEnd/>
+              </a14:hiddenLine>
+            </a:ext>
+            <a:ext uri="{AF507438-7753-43E0-B8FC-AC1667EBCBE1}">
+              <a14:hiddenEffects xmlns:a14="http://schemas.microsoft.com/office/drawing/2010/main">
+                <a:effectLst>
+                  <a:outerShdw dist="35921" dir="2700000" algn="ctr" rotWithShape="0">
+                    <a:schemeClr val="bg2"/>
+                  </a:outerShdw>
+                </a:effectLst>
+              </a14:hiddenEffects>
+            </a:ext>
+          </a:extLst>
+        </p:spPr>
+        <p:txBody>
+          <a:bodyPr vert="horz" wrap="none" lIns="91440" tIns="46023" rIns="91440" bIns="92046" numCol="1" anchor="ctr" anchorCtr="0" compatLnSpc="1">
+            <a:prstTxWarp prst="textNoShape">
+              <a:avLst/>
+            </a:prstTxWarp>
+            <a:spAutoFit/>
           </a:bodyPr>
-          <a:lstStyle>
-            <a:lvl1pPr algn="l" defTabSz="914400" rtl="0" eaLnBrk="1" latinLnBrk="0" hangingPunct="1">
+          <a:lstStyle/>
+          <a:p>
+            <a:pPr marL="0" marR="0" lvl="0" indent="0" algn="l" defTabSz="914400" rtl="0" eaLnBrk="0" fontAlgn="base" latinLnBrk="0" hangingPunct="0">
               <a:lnSpc>
-                <a:spcPct val="90000"/>
+                <a:spcPct val="100000"/>
               </a:lnSpc>
               <a:spcBef>
                 <a:spcPct val="0"/>
               </a:spcBef>
+              <a:spcAft>
+                <a:spcPct val="0"/>
+              </a:spcAft>
+              <a:buClrTx/>
+              <a:buSzTx/>
+              <a:buFontTx/>
               <a:buNone/>
-              <a:defRPr kumimoji="1" sz="4400" kern="1200">
+              <a:tabLst/>
+            </a:pPr>
+            <a:endParaRPr kumimoji="0" lang="ja-JP" altLang="ja-JP" sz="1800" b="0" i="0" u="none" strike="noStrike" cap="none" normalizeH="0" baseline="0" smtClean="0">
+              <a:ln>
+                <a:noFill/>
+              </a:ln>
+              <a:solidFill>
+                <a:schemeClr val="tx1"/>
+              </a:solidFill>
+              <a:effectLst/>
+              <a:latin typeface="Arial" panose="020B0604020202020204" pitchFamily="34" charset="0"/>
+            </a:endParaRPr>
+          </a:p>
+          <a:p>
+            <a:pPr marL="0" marR="0" lvl="0" indent="0" algn="l" defTabSz="914400" rtl="0" eaLnBrk="0" fontAlgn="base" latinLnBrk="0" hangingPunct="0">
+              <a:lnSpc>
+                <a:spcPct val="100000"/>
+              </a:lnSpc>
+              <a:spcBef>
+                <a:spcPct val="0"/>
+              </a:spcBef>
+              <a:spcAft>
+                <a:spcPct val="0"/>
+              </a:spcAft>
+              <a:buClrTx/>
+              <a:buSzTx/>
+              <a:buFontTx/>
+              <a:buChar char="•"/>
+              <a:tabLst/>
+            </a:pPr>
+            <a:r>
+              <a:rPr kumimoji="0" lang="ja-JP" altLang="ja-JP" sz="1000" b="0" i="0" u="none" strike="noStrike" cap="none" normalizeH="0" baseline="0" smtClean="0">
+                <a:ln>
+                  <a:noFill/>
+                </a:ln>
                 <a:solidFill>
-                  <a:schemeClr val="tx1"/>
+                  <a:srgbClr val="FFFFFF"/>
                 </a:solidFill>
-                <a:latin typeface="+mj-lt"/>
-                <a:ea typeface="+mj-ea"/>
-                <a:cs typeface="+mj-cs"/>
-              </a:defRPr>
-            </a:lvl1pPr>
-          </a:lstStyle>
-          <a:p>
-            <a:r>
-              <a:rPr lang="ja-JP" altLang="en-US" smtClean="0"/>
-              <a:t>一般的利用形態</a:t>
-            </a:r>
-            <a:endParaRPr lang="ja-JP" altLang="en-US" dirty="0"/>
-          </a:p>
-        </p:txBody>
-      </p:sp>
-      <p:pic>
-        <p:nvPicPr>
-          <p:cNvPr id="8" name="図 7"/>
-          <p:cNvPicPr>
-            <a:picLocks noChangeAspect="1"/>
-          </p:cNvPicPr>
+                <a:effectLst/>
+                <a:latin typeface="Arial" panose="020B0604020202020204" pitchFamily="34" charset="0"/>
+                <a:ea typeface="-apple-system"/>
+              </a:rPr>
+              <a:t>チームごとのアクセス管理</a:t>
+            </a:r>
+          </a:p>
+          <a:p>
+            <a:pPr marL="0" marR="0" lvl="0" indent="0" algn="l" defTabSz="914400" rtl="0" eaLnBrk="0" fontAlgn="base" latinLnBrk="0" hangingPunct="0">
+              <a:lnSpc>
+                <a:spcPct val="100000"/>
+              </a:lnSpc>
+              <a:spcBef>
+                <a:spcPct val="0"/>
+              </a:spcBef>
+              <a:spcAft>
+                <a:spcPct val="0"/>
+              </a:spcAft>
+              <a:buClrTx/>
+              <a:buSzTx/>
+              <a:buFontTx/>
+              <a:buChar char="•"/>
+              <a:tabLst/>
+            </a:pPr>
+            <a:r>
+              <a:rPr kumimoji="0" lang="ja-JP" altLang="ja-JP" sz="1000" b="0" i="0" u="none" strike="noStrike" cap="none" normalizeH="0" baseline="0" smtClean="0">
+                <a:ln>
+                  <a:noFill/>
+                </a:ln>
+                <a:solidFill>
+                  <a:srgbClr val="FFFFFF"/>
+                </a:solidFill>
+                <a:effectLst/>
+                <a:latin typeface="Arial" panose="020B0604020202020204" pitchFamily="34" charset="0"/>
+                <a:ea typeface="-apple-system"/>
+              </a:rPr>
+              <a:t>  </a:t>
+            </a:r>
+            <a:r>
+              <a:rPr kumimoji="0" lang="ja-JP" altLang="ja-JP" sz="1900" b="0" i="0" u="none" strike="noStrike" cap="none" normalizeH="0" baseline="0" smtClean="0">
+                <a:ln>
+                  <a:noFill/>
+                </a:ln>
+                <a:solidFill>
+                  <a:srgbClr val="FFFFFF"/>
+                </a:solidFill>
+                <a:effectLst/>
+                <a:latin typeface="Arial" panose="020B0604020202020204" pitchFamily="34" charset="0"/>
+                <a:ea typeface="-apple-system"/>
+              </a:rPr>
+              <a:t>ユ</a:t>
+            </a:r>
+            <a:r>
+              <a:rPr kumimoji="0" lang="ja-JP" altLang="ja-JP" sz="1000" b="0" i="0" u="none" strike="noStrike" cap="none" normalizeH="0" baseline="0" smtClean="0">
+                <a:ln>
+                  <a:noFill/>
+                </a:ln>
+                <a:solidFill>
+                  <a:srgbClr val="FFFFFF"/>
+                </a:solidFill>
+                <a:effectLst/>
+                <a:latin typeface="Arial" panose="020B0604020202020204" pitchFamily="34" charset="0"/>
+                <a:ea typeface="-apple-system"/>
+              </a:rPr>
+              <a:t>ーザー管理</a:t>
+            </a:r>
+          </a:p>
+          <a:p>
+            <a:pPr marL="0" marR="0" lvl="0" indent="0" algn="l" defTabSz="914400" rtl="0" eaLnBrk="0" fontAlgn="base" latinLnBrk="0" hangingPunct="0">
+              <a:lnSpc>
+                <a:spcPct val="100000"/>
+              </a:lnSpc>
+              <a:spcBef>
+                <a:spcPct val="0"/>
+              </a:spcBef>
+              <a:spcAft>
+                <a:spcPct val="0"/>
+              </a:spcAft>
+              <a:buClrTx/>
+              <a:buSzTx/>
+              <a:buFontTx/>
+              <a:buNone/>
+              <a:tabLst/>
+            </a:pPr>
+            <a:endParaRPr kumimoji="0" lang="ja-JP" altLang="ja-JP" sz="1000" b="0" i="0" u="none" strike="noStrike" cap="none" normalizeH="0" baseline="0" smtClean="0">
+              <a:ln>
+                <a:noFill/>
+              </a:ln>
+              <a:solidFill>
+                <a:srgbClr val="FFFFFF"/>
+              </a:solidFill>
+              <a:effectLst/>
+              <a:latin typeface="Arial" panose="020B0604020202020204" pitchFamily="34" charset="0"/>
+              <a:ea typeface="-apple-system"/>
+            </a:endParaRPr>
+          </a:p>
+        </p:txBody>
+      </p:sp>
+      <p:sp>
+        <p:nvSpPr>
+          <p:cNvPr id="5" name="AutoShape 2" descr="✓"/>
+          <p:cNvSpPr>
+            <a:spLocks noChangeAspect="1" noChangeArrowheads="1"/>
+          </p:cNvSpPr>
           <p:nvPr/>
-        </p:nvPicPr>
-        <p:blipFill>
-          <a:blip r:embed="rId2" cstate="print">
-            <a:extLst>
-              <a:ext uri="{28A0092B-C50C-407E-A947-70E740481C1C}">
-                <a14:useLocalDpi xmlns:a14="http://schemas.microsoft.com/office/drawing/2010/main" val="0"/>
-              </a:ext>
-            </a:extLst>
-          </a:blip>
-          <a:stretch>
-            <a:fillRect/>
-          </a:stretch>
-        </p:blipFill>
-        <p:spPr>
+        </p:nvSpPr>
+        <p:spPr bwMode="auto">
           <a:xfrm>
-            <a:off x="1247702" y="5666684"/>
-            <a:ext cx="596138" cy="917136"/>
-          </a:xfrm>
-          <a:prstGeom prst="rect">
-            <a:avLst/>
-          </a:prstGeom>
-        </p:spPr>
-      </p:pic>
-      <p:sp>
-        <p:nvSpPr>
-          <p:cNvPr id="10" name="フローチャート: 複数書類 9"/>
-          <p:cNvSpPr/>
-          <p:nvPr/>
-        </p:nvSpPr>
-        <p:spPr>
-          <a:xfrm>
-            <a:off x="6150428" y="5423123"/>
-            <a:ext cx="1240972" cy="1251857"/>
-          </a:xfrm>
-          <a:prstGeom prst="flowChartMultidocument">
-            <a:avLst/>
-          </a:prstGeom>
-        </p:spPr>
-        <p:style>
-          <a:lnRef idx="2">
-            <a:schemeClr val="accent1">
-              <a:shade val="50000"/>
-            </a:schemeClr>
-          </a:lnRef>
-          <a:fillRef idx="1">
-            <a:schemeClr val="accent1"/>
-          </a:fillRef>
-          <a:effectRef idx="0">
-            <a:schemeClr val="accent1"/>
-          </a:effectRef>
-          <a:fontRef idx="minor">
-            <a:schemeClr val="lt1"/>
-          </a:fontRef>
-        </p:style>
-        <p:txBody>
-          <a:bodyPr rtlCol="0" anchor="ctr"/>
-          <a:lstStyle/>
-          <a:p>
-            <a:pPr algn="ctr"/>
-            <a:r>
-              <a:rPr kumimoji="1" lang="ja-JP" altLang="en-US" dirty="0" smtClean="0"/>
-              <a:t>ローカルリポジトリ</a:t>
-            </a:r>
-            <a:endParaRPr kumimoji="1" lang="ja-JP" altLang="en-US" dirty="0"/>
-          </a:p>
-        </p:txBody>
-      </p:sp>
-      <p:pic>
-        <p:nvPicPr>
-          <p:cNvPr id="11" name="図 10"/>
-          <p:cNvPicPr>
-            <a:picLocks noChangeAspect="1"/>
-          </p:cNvPicPr>
-          <p:nvPr/>
-        </p:nvPicPr>
-        <p:blipFill>
-          <a:blip r:embed="rId2" cstate="print">
-            <a:extLst>
-              <a:ext uri="{28A0092B-C50C-407E-A947-70E740481C1C}">
-                <a14:useLocalDpi xmlns:a14="http://schemas.microsoft.com/office/drawing/2010/main" val="0"/>
-              </a:ext>
-            </a:extLst>
-          </a:blip>
-          <a:stretch>
-            <a:fillRect/>
-          </a:stretch>
-        </p:blipFill>
-        <p:spPr>
-          <a:xfrm>
-            <a:off x="4927074" y="5590484"/>
-            <a:ext cx="596138" cy="917136"/>
-          </a:xfrm>
-          <a:prstGeom prst="rect">
-            <a:avLst/>
-          </a:prstGeom>
-        </p:spPr>
-      </p:pic>
-      <p:sp>
-        <p:nvSpPr>
-          <p:cNvPr id="12" name="フローチャート: 複数書類 11"/>
-          <p:cNvSpPr/>
-          <p:nvPr/>
-        </p:nvSpPr>
-        <p:spPr>
-          <a:xfrm>
-            <a:off x="9753599" y="5331963"/>
-            <a:ext cx="1240972" cy="1251857"/>
-          </a:xfrm>
-          <a:prstGeom prst="flowChartMultidocument">
-            <a:avLst/>
-          </a:prstGeom>
-        </p:spPr>
-        <p:style>
-          <a:lnRef idx="2">
-            <a:schemeClr val="accent1">
-              <a:shade val="50000"/>
-            </a:schemeClr>
-          </a:lnRef>
-          <a:fillRef idx="1">
-            <a:schemeClr val="accent1"/>
-          </a:fillRef>
-          <a:effectRef idx="0">
-            <a:schemeClr val="accent1"/>
-          </a:effectRef>
-          <a:fontRef idx="minor">
-            <a:schemeClr val="lt1"/>
-          </a:fontRef>
-        </p:style>
-        <p:txBody>
-          <a:bodyPr rtlCol="0" anchor="ctr"/>
-          <a:lstStyle/>
-          <a:p>
-            <a:pPr algn="ctr"/>
-            <a:r>
-              <a:rPr kumimoji="1" lang="ja-JP" altLang="en-US" dirty="0" smtClean="0"/>
-              <a:t>ローカルリポジトリ</a:t>
-            </a:r>
-            <a:endParaRPr kumimoji="1" lang="ja-JP" altLang="en-US" dirty="0"/>
-          </a:p>
-        </p:txBody>
-      </p:sp>
-      <p:pic>
-        <p:nvPicPr>
-          <p:cNvPr id="13" name="図 12"/>
-          <p:cNvPicPr>
-            <a:picLocks noChangeAspect="1"/>
-          </p:cNvPicPr>
-          <p:nvPr/>
-        </p:nvPicPr>
-        <p:blipFill>
-          <a:blip r:embed="rId2" cstate="print">
-            <a:extLst>
-              <a:ext uri="{28A0092B-C50C-407E-A947-70E740481C1C}">
-                <a14:useLocalDpi xmlns:a14="http://schemas.microsoft.com/office/drawing/2010/main" val="0"/>
-              </a:ext>
-            </a:extLst>
-          </a:blip>
-          <a:stretch>
-            <a:fillRect/>
-          </a:stretch>
-        </p:blipFill>
-        <p:spPr>
-          <a:xfrm>
-            <a:off x="8530245" y="5499324"/>
-            <a:ext cx="596138" cy="917136"/>
-          </a:xfrm>
-          <a:prstGeom prst="rect">
-            <a:avLst/>
-          </a:prstGeom>
-        </p:spPr>
-      </p:pic>
-      <p:cxnSp>
-        <p:nvCxnSpPr>
-          <p:cNvPr id="14" name="直線矢印コネクタ 13"/>
-          <p:cNvCxnSpPr/>
-          <p:nvPr/>
-        </p:nvCxnSpPr>
-        <p:spPr>
-          <a:xfrm flipV="1">
-            <a:off x="3592531" y="2505082"/>
-            <a:ext cx="2598051" cy="3014269"/>
-          </a:xfrm>
-          <a:prstGeom prst="straightConnector1">
-            <a:avLst/>
-          </a:prstGeom>
-          <a:ln>
-            <a:tailEnd type="triangle"/>
-          </a:ln>
-        </p:spPr>
-        <p:style>
-          <a:lnRef idx="1">
-            <a:schemeClr val="accent1"/>
-          </a:lnRef>
-          <a:fillRef idx="0">
-            <a:schemeClr val="accent1"/>
-          </a:fillRef>
-          <a:effectRef idx="0">
-            <a:schemeClr val="accent1"/>
-          </a:effectRef>
-          <a:fontRef idx="minor">
-            <a:schemeClr val="tx1"/>
-          </a:fontRef>
-        </p:style>
-      </p:cxnSp>
-      <p:cxnSp>
-        <p:nvCxnSpPr>
-          <p:cNvPr id="15" name="直線矢印コネクタ 14"/>
-          <p:cNvCxnSpPr/>
-          <p:nvPr/>
-        </p:nvCxnSpPr>
-        <p:spPr>
-          <a:xfrm flipH="1" flipV="1">
-            <a:off x="6823781" y="2530750"/>
-            <a:ext cx="30943" cy="3023354"/>
-          </a:xfrm>
-          <a:prstGeom prst="straightConnector1">
-            <a:avLst/>
-          </a:prstGeom>
-          <a:ln>
-            <a:tailEnd type="triangle"/>
-          </a:ln>
-        </p:spPr>
-        <p:style>
-          <a:lnRef idx="1">
-            <a:schemeClr val="accent1"/>
-          </a:lnRef>
-          <a:fillRef idx="0">
-            <a:schemeClr val="accent1"/>
-          </a:fillRef>
-          <a:effectRef idx="0">
-            <a:schemeClr val="accent1"/>
-          </a:effectRef>
-          <a:fontRef idx="minor">
-            <a:schemeClr val="tx1"/>
-          </a:fontRef>
-        </p:style>
-      </p:cxnSp>
-      <p:cxnSp>
-        <p:nvCxnSpPr>
-          <p:cNvPr id="16" name="直線矢印コネクタ 15"/>
-          <p:cNvCxnSpPr/>
-          <p:nvPr/>
-        </p:nvCxnSpPr>
-        <p:spPr>
-          <a:xfrm flipH="1" flipV="1">
-            <a:off x="7482818" y="2318088"/>
-            <a:ext cx="2572939" cy="2877071"/>
-          </a:xfrm>
-          <a:prstGeom prst="straightConnector1">
-            <a:avLst/>
-          </a:prstGeom>
-          <a:ln>
-            <a:tailEnd type="triangle"/>
-          </a:ln>
-        </p:spPr>
-        <p:style>
-          <a:lnRef idx="1">
-            <a:schemeClr val="accent1"/>
-          </a:lnRef>
-          <a:fillRef idx="0">
-            <a:schemeClr val="accent1"/>
-          </a:fillRef>
-          <a:effectRef idx="0">
-            <a:schemeClr val="accent1"/>
-          </a:effectRef>
-          <a:fontRef idx="minor">
-            <a:schemeClr val="tx1"/>
-          </a:fontRef>
-        </p:style>
-      </p:cxnSp>
-      <p:sp>
-        <p:nvSpPr>
-          <p:cNvPr id="17" name="フローチャート: 複数書類 16"/>
-          <p:cNvSpPr/>
-          <p:nvPr/>
-        </p:nvSpPr>
-        <p:spPr>
-          <a:xfrm>
-            <a:off x="6211586" y="1344383"/>
-            <a:ext cx="1240972" cy="1251857"/>
-          </a:xfrm>
-          <a:prstGeom prst="flowChartMultidocument">
-            <a:avLst/>
-          </a:prstGeom>
-        </p:spPr>
-        <p:style>
-          <a:lnRef idx="2">
-            <a:schemeClr val="accent1">
-              <a:shade val="50000"/>
-            </a:schemeClr>
-          </a:lnRef>
-          <a:fillRef idx="1">
-            <a:schemeClr val="accent1"/>
-          </a:fillRef>
-          <a:effectRef idx="0">
-            <a:schemeClr val="accent1"/>
-          </a:effectRef>
-          <a:fontRef idx="minor">
-            <a:schemeClr val="lt1"/>
-          </a:fontRef>
-        </p:style>
-        <p:txBody>
-          <a:bodyPr rtlCol="0" anchor="ctr"/>
-          <a:lstStyle/>
-          <a:p>
-            <a:pPr algn="ctr"/>
-            <a:r>
-              <a:rPr kumimoji="1" lang="ja-JP" altLang="en-US" dirty="0" smtClean="0"/>
-              <a:t>中央リポジトリ</a:t>
-            </a:r>
-            <a:endParaRPr kumimoji="1" lang="ja-JP" altLang="en-US" dirty="0"/>
-          </a:p>
-        </p:txBody>
-      </p:sp>
-      <p:cxnSp>
-        <p:nvCxnSpPr>
-          <p:cNvPr id="18" name="直線矢印コネクタ 17"/>
-          <p:cNvCxnSpPr/>
-          <p:nvPr/>
-        </p:nvCxnSpPr>
-        <p:spPr>
-          <a:xfrm flipV="1">
-            <a:off x="1719177" y="2339956"/>
-            <a:ext cx="4408599" cy="3439909"/>
-          </a:xfrm>
-          <a:prstGeom prst="straightConnector1">
-            <a:avLst/>
-          </a:prstGeom>
-          <a:ln>
-            <a:tailEnd type="triangle"/>
-          </a:ln>
-        </p:spPr>
-        <p:style>
-          <a:lnRef idx="1">
-            <a:schemeClr val="accent1"/>
-          </a:lnRef>
-          <a:fillRef idx="0">
-            <a:schemeClr val="accent1"/>
-          </a:fillRef>
-          <a:effectRef idx="0">
-            <a:schemeClr val="accent1"/>
-          </a:effectRef>
-          <a:fontRef idx="minor">
-            <a:schemeClr val="tx1"/>
-          </a:fontRef>
-        </p:style>
-      </p:cxnSp>
-      <p:cxnSp>
-        <p:nvCxnSpPr>
-          <p:cNvPr id="19" name="直線矢印コネクタ 18"/>
-          <p:cNvCxnSpPr/>
-          <p:nvPr/>
-        </p:nvCxnSpPr>
-        <p:spPr>
-          <a:xfrm flipV="1">
-            <a:off x="5266906" y="2658421"/>
-            <a:ext cx="1379313" cy="2900737"/>
-          </a:xfrm>
-          <a:prstGeom prst="straightConnector1">
-            <a:avLst/>
-          </a:prstGeom>
-          <a:ln>
-            <a:tailEnd type="triangle"/>
-          </a:ln>
-        </p:spPr>
-        <p:style>
-          <a:lnRef idx="1">
-            <a:schemeClr val="accent1"/>
-          </a:lnRef>
-          <a:fillRef idx="0">
-            <a:schemeClr val="accent1"/>
-          </a:fillRef>
-          <a:effectRef idx="0">
-            <a:schemeClr val="accent1"/>
-          </a:effectRef>
-          <a:fontRef idx="minor">
-            <a:schemeClr val="tx1"/>
-          </a:fontRef>
-        </p:style>
-      </p:cxnSp>
-      <p:cxnSp>
-        <p:nvCxnSpPr>
-          <p:cNvPr id="20" name="直線矢印コネクタ 19"/>
-          <p:cNvCxnSpPr/>
-          <p:nvPr/>
-        </p:nvCxnSpPr>
-        <p:spPr>
-          <a:xfrm flipH="1" flipV="1">
-            <a:off x="7358096" y="2351314"/>
-            <a:ext cx="1208314" cy="3354838"/>
-          </a:xfrm>
-          <a:prstGeom prst="straightConnector1">
-            <a:avLst/>
-          </a:prstGeom>
-          <a:ln>
-            <a:tailEnd type="triangle"/>
-          </a:ln>
-        </p:spPr>
-        <p:style>
-          <a:lnRef idx="1">
-            <a:schemeClr val="accent1"/>
-          </a:lnRef>
-          <a:fillRef idx="0">
-            <a:schemeClr val="accent1"/>
-          </a:fillRef>
-          <a:effectRef idx="0">
-            <a:schemeClr val="accent1"/>
-          </a:effectRef>
-          <a:fontRef idx="minor">
-            <a:schemeClr val="tx1"/>
-          </a:fontRef>
-        </p:style>
-      </p:cxnSp>
-      <p:cxnSp>
-        <p:nvCxnSpPr>
-          <p:cNvPr id="21" name="直線矢印コネクタ 20"/>
-          <p:cNvCxnSpPr/>
-          <p:nvPr/>
-        </p:nvCxnSpPr>
-        <p:spPr>
-          <a:xfrm flipV="1">
-            <a:off x="1843840" y="6034759"/>
-            <a:ext cx="529245" cy="14292"/>
-          </a:xfrm>
-          <a:prstGeom prst="straightConnector1">
-            <a:avLst/>
-          </a:prstGeom>
-          <a:ln>
-            <a:tailEnd type="triangle"/>
-          </a:ln>
-        </p:spPr>
-        <p:style>
-          <a:lnRef idx="1">
-            <a:schemeClr val="accent1"/>
-          </a:lnRef>
-          <a:fillRef idx="0">
-            <a:schemeClr val="accent1"/>
-          </a:fillRef>
-          <a:effectRef idx="0">
-            <a:schemeClr val="accent1"/>
-          </a:effectRef>
-          <a:fontRef idx="minor">
-            <a:schemeClr val="tx1"/>
-          </a:fontRef>
-        </p:style>
-      </p:cxnSp>
-      <p:cxnSp>
-        <p:nvCxnSpPr>
-          <p:cNvPr id="22" name="直線矢印コネクタ 21"/>
-          <p:cNvCxnSpPr>
-            <a:stCxn id="11" idx="3"/>
-          </p:cNvCxnSpPr>
-          <p:nvPr/>
-        </p:nvCxnSpPr>
-        <p:spPr>
-          <a:xfrm flipV="1">
-            <a:off x="5523212" y="6049051"/>
-            <a:ext cx="572788" cy="1"/>
-          </a:xfrm>
-          <a:prstGeom prst="straightConnector1">
-            <a:avLst/>
-          </a:prstGeom>
-          <a:ln>
-            <a:tailEnd type="triangle"/>
-          </a:ln>
-        </p:spPr>
-        <p:style>
-          <a:lnRef idx="1">
-            <a:schemeClr val="accent1"/>
-          </a:lnRef>
-          <a:fillRef idx="0">
-            <a:schemeClr val="accent1"/>
-          </a:fillRef>
-          <a:effectRef idx="0">
-            <a:schemeClr val="accent1"/>
-          </a:effectRef>
-          <a:fontRef idx="minor">
-            <a:schemeClr val="tx1"/>
-          </a:fontRef>
-        </p:style>
-      </p:cxnSp>
-      <p:cxnSp>
-        <p:nvCxnSpPr>
-          <p:cNvPr id="23" name="直線矢印コネクタ 22"/>
-          <p:cNvCxnSpPr>
-            <a:stCxn id="13" idx="3"/>
-          </p:cNvCxnSpPr>
-          <p:nvPr/>
-        </p:nvCxnSpPr>
-        <p:spPr>
-          <a:xfrm flipV="1">
-            <a:off x="9126383" y="5957891"/>
-            <a:ext cx="540131" cy="1"/>
-          </a:xfrm>
-          <a:prstGeom prst="straightConnector1">
-            <a:avLst/>
-          </a:prstGeom>
-          <a:ln>
-            <a:tailEnd type="triangle"/>
-          </a:ln>
-        </p:spPr>
-        <p:style>
-          <a:lnRef idx="1">
-            <a:schemeClr val="accent1"/>
-          </a:lnRef>
-          <a:fillRef idx="0">
-            <a:schemeClr val="accent1"/>
-          </a:fillRef>
-          <a:effectRef idx="0">
-            <a:schemeClr val="accent1"/>
-          </a:effectRef>
-          <a:fontRef idx="minor">
-            <a:schemeClr val="tx1"/>
-          </a:fontRef>
-        </p:style>
-      </p:cxnSp>
-      <p:sp>
-        <p:nvSpPr>
-          <p:cNvPr id="24" name="テキスト ボックス 23"/>
-          <p:cNvSpPr txBox="1"/>
-          <p:nvPr/>
-        </p:nvSpPr>
-        <p:spPr>
-          <a:xfrm>
-            <a:off x="3099624" y="4970347"/>
-            <a:ext cx="639919" cy="369332"/>
+            <a:off x="79375" y="-6350"/>
+            <a:ext cx="304800" cy="304800"/>
           </a:xfrm>
           <a:prstGeom prst="rect">
             <a:avLst/>
           </a:prstGeom>
           <a:noFill/>
-        </p:spPr>
-        <p:txBody>
-          <a:bodyPr wrap="none" rtlCol="0">
-            <a:spAutoFit/>
+          <a:extLst>
+            <a:ext uri="{909E8E84-426E-40DD-AFC4-6F175D3DCCD1}">
+              <a14:hiddenFill xmlns:a14="http://schemas.microsoft.com/office/drawing/2010/main">
+                <a:solidFill>
+                  <a:srgbClr val="FFFFFF"/>
+                </a:solidFill>
+              </a14:hiddenFill>
+            </a:ext>
+          </a:extLst>
+        </p:spPr>
+        <p:txBody>
+          <a:bodyPr vert="horz" wrap="square" lIns="91440" tIns="45720" rIns="91440" bIns="45720" numCol="1" anchor="t" anchorCtr="0" compatLnSpc="1">
+            <a:prstTxWarp prst="textNoShape">
+              <a:avLst/>
+            </a:prstTxWarp>
           </a:bodyPr>
           <a:lstStyle/>
           <a:p>
-            <a:r>
-              <a:rPr kumimoji="1" lang="en-US" altLang="ja-JP" dirty="0" smtClean="0"/>
-              <a:t>push</a:t>
-            </a:r>
-            <a:endParaRPr kumimoji="1" lang="ja-JP" altLang="en-US" dirty="0"/>
-          </a:p>
-        </p:txBody>
-      </p:sp>
-      <p:sp>
-        <p:nvSpPr>
-          <p:cNvPr id="25" name="テキスト ボックス 24"/>
-          <p:cNvSpPr txBox="1"/>
-          <p:nvPr/>
-        </p:nvSpPr>
-        <p:spPr>
-          <a:xfrm>
-            <a:off x="6086086" y="4846155"/>
-            <a:ext cx="639919" cy="369332"/>
-          </a:xfrm>
-          <a:prstGeom prst="rect">
-            <a:avLst/>
-          </a:prstGeom>
-          <a:noFill/>
-        </p:spPr>
-        <p:txBody>
-          <a:bodyPr wrap="none" rtlCol="0">
-            <a:spAutoFit/>
-          </a:bodyPr>
-          <a:lstStyle/>
-          <a:p>
-            <a:r>
-              <a:rPr kumimoji="1" lang="en-US" altLang="ja-JP" dirty="0" smtClean="0"/>
-              <a:t>push</a:t>
-            </a:r>
-            <a:endParaRPr kumimoji="1" lang="ja-JP" altLang="en-US" dirty="0"/>
-          </a:p>
-        </p:txBody>
-      </p:sp>
-      <p:sp>
-        <p:nvSpPr>
-          <p:cNvPr id="26" name="テキスト ボックス 25"/>
-          <p:cNvSpPr txBox="1"/>
-          <p:nvPr/>
-        </p:nvSpPr>
-        <p:spPr>
-          <a:xfrm>
-            <a:off x="9000559" y="4688549"/>
-            <a:ext cx="639919" cy="369332"/>
-          </a:xfrm>
-          <a:prstGeom prst="rect">
-            <a:avLst/>
-          </a:prstGeom>
-          <a:noFill/>
-        </p:spPr>
-        <p:txBody>
-          <a:bodyPr wrap="none" rtlCol="0">
-            <a:spAutoFit/>
-          </a:bodyPr>
-          <a:lstStyle/>
-          <a:p>
-            <a:r>
-              <a:rPr kumimoji="1" lang="en-US" altLang="ja-JP" dirty="0" smtClean="0"/>
-              <a:t>push</a:t>
-            </a:r>
-            <a:endParaRPr kumimoji="1" lang="ja-JP" altLang="en-US" dirty="0"/>
-          </a:p>
-        </p:txBody>
-      </p:sp>
-      <p:sp>
-        <p:nvSpPr>
-          <p:cNvPr id="27" name="テキスト ボックス 26"/>
-          <p:cNvSpPr txBox="1"/>
-          <p:nvPr/>
-        </p:nvSpPr>
-        <p:spPr>
-          <a:xfrm>
-            <a:off x="1801524" y="6056737"/>
-            <a:ext cx="763351" cy="307777"/>
-          </a:xfrm>
-          <a:prstGeom prst="rect">
-            <a:avLst/>
-          </a:prstGeom>
-          <a:noFill/>
-        </p:spPr>
-        <p:txBody>
-          <a:bodyPr wrap="none" rtlCol="0">
-            <a:spAutoFit/>
-          </a:bodyPr>
-          <a:lstStyle/>
-          <a:p>
-            <a:r>
-              <a:rPr kumimoji="1" lang="en-US" altLang="ja-JP" sz="1400" dirty="0" smtClean="0"/>
-              <a:t>Commit</a:t>
-            </a:r>
-            <a:endParaRPr kumimoji="1" lang="ja-JP" altLang="en-US" sz="1400" dirty="0"/>
-          </a:p>
-        </p:txBody>
-      </p:sp>
-      <p:sp>
-        <p:nvSpPr>
-          <p:cNvPr id="28" name="テキスト ボックス 27"/>
-          <p:cNvSpPr txBox="1"/>
-          <p:nvPr/>
-        </p:nvSpPr>
-        <p:spPr>
-          <a:xfrm>
-            <a:off x="5478705" y="6055533"/>
-            <a:ext cx="763351" cy="307777"/>
-          </a:xfrm>
-          <a:prstGeom prst="rect">
-            <a:avLst/>
-          </a:prstGeom>
-          <a:noFill/>
-        </p:spPr>
-        <p:txBody>
-          <a:bodyPr wrap="none" rtlCol="0">
-            <a:spAutoFit/>
-          </a:bodyPr>
-          <a:lstStyle/>
-          <a:p>
-            <a:r>
-              <a:rPr kumimoji="1" lang="en-US" altLang="ja-JP" sz="1400" dirty="0" smtClean="0"/>
-              <a:t>Commit</a:t>
-            </a:r>
-            <a:endParaRPr kumimoji="1" lang="ja-JP" altLang="en-US" sz="1400" dirty="0"/>
-          </a:p>
-        </p:txBody>
-      </p:sp>
-      <p:sp>
-        <p:nvSpPr>
-          <p:cNvPr id="29" name="テキスト ボックス 28"/>
-          <p:cNvSpPr txBox="1"/>
-          <p:nvPr/>
-        </p:nvSpPr>
-        <p:spPr>
-          <a:xfrm>
-            <a:off x="9029903" y="5850097"/>
-            <a:ext cx="733089" cy="307777"/>
-          </a:xfrm>
-          <a:prstGeom prst="rect">
-            <a:avLst/>
-          </a:prstGeom>
-          <a:noFill/>
-        </p:spPr>
-        <p:txBody>
-          <a:bodyPr wrap="square" rtlCol="0">
-            <a:spAutoFit/>
-          </a:bodyPr>
-          <a:lstStyle/>
-          <a:p>
-            <a:r>
-              <a:rPr kumimoji="1" lang="en-US" altLang="ja-JP" sz="1400" dirty="0" err="1" smtClean="0"/>
-              <a:t>Commi</a:t>
-            </a:r>
-            <a:endParaRPr kumimoji="1" lang="ja-JP" altLang="en-US" sz="1400" dirty="0"/>
-          </a:p>
-        </p:txBody>
-      </p:sp>
-      <p:sp>
-        <p:nvSpPr>
-          <p:cNvPr id="30" name="テキスト ボックス 29"/>
-          <p:cNvSpPr txBox="1"/>
-          <p:nvPr/>
-        </p:nvSpPr>
-        <p:spPr>
-          <a:xfrm>
-            <a:off x="5098823" y="4124306"/>
-            <a:ext cx="1343445" cy="369332"/>
-          </a:xfrm>
-          <a:prstGeom prst="rect">
-            <a:avLst/>
-          </a:prstGeom>
-          <a:noFill/>
-        </p:spPr>
-        <p:txBody>
-          <a:bodyPr wrap="none" rtlCol="0">
-            <a:spAutoFit/>
-          </a:bodyPr>
-          <a:lstStyle/>
-          <a:p>
-            <a:r>
-              <a:rPr kumimoji="1" lang="en-US" altLang="ja-JP" dirty="0" smtClean="0"/>
-              <a:t>Pull Request</a:t>
-            </a:r>
-            <a:endParaRPr kumimoji="1" lang="ja-JP" altLang="en-US" dirty="0"/>
-          </a:p>
-        </p:txBody>
-      </p:sp>
-      <p:sp>
-        <p:nvSpPr>
-          <p:cNvPr id="31" name="テキスト ボックス 30"/>
-          <p:cNvSpPr txBox="1"/>
-          <p:nvPr/>
-        </p:nvSpPr>
-        <p:spPr>
-          <a:xfrm>
-            <a:off x="3420089" y="3642884"/>
-            <a:ext cx="1343445" cy="369332"/>
-          </a:xfrm>
-          <a:prstGeom prst="rect">
-            <a:avLst/>
-          </a:prstGeom>
-          <a:noFill/>
-        </p:spPr>
-        <p:txBody>
-          <a:bodyPr wrap="none" rtlCol="0">
-            <a:spAutoFit/>
-          </a:bodyPr>
-          <a:lstStyle/>
-          <a:p>
-            <a:r>
-              <a:rPr kumimoji="1" lang="en-US" altLang="ja-JP" dirty="0" smtClean="0"/>
-              <a:t>Pull Request</a:t>
-            </a:r>
-            <a:endParaRPr kumimoji="1" lang="ja-JP" altLang="en-US" dirty="0"/>
-          </a:p>
-        </p:txBody>
-      </p:sp>
-      <p:sp>
-        <p:nvSpPr>
-          <p:cNvPr id="32" name="テキスト ボックス 31"/>
-          <p:cNvSpPr txBox="1"/>
-          <p:nvPr/>
-        </p:nvSpPr>
-        <p:spPr>
-          <a:xfrm>
-            <a:off x="7425842" y="3682148"/>
-            <a:ext cx="1343445" cy="369332"/>
-          </a:xfrm>
-          <a:prstGeom prst="rect">
-            <a:avLst/>
-          </a:prstGeom>
-          <a:noFill/>
-        </p:spPr>
-        <p:txBody>
-          <a:bodyPr wrap="none" rtlCol="0">
-            <a:spAutoFit/>
-          </a:bodyPr>
-          <a:lstStyle/>
-          <a:p>
-            <a:r>
-              <a:rPr kumimoji="1" lang="en-US" altLang="ja-JP" dirty="0" smtClean="0"/>
-              <a:t>Pull Request</a:t>
-            </a:r>
-            <a:endParaRPr kumimoji="1" lang="ja-JP" altLang="en-US" dirty="0"/>
-          </a:p>
-        </p:txBody>
-      </p:sp>
-      <p:sp>
-        <p:nvSpPr>
-          <p:cNvPr id="33" name="フローチャート: 複数書類 32"/>
-          <p:cNvSpPr/>
-          <p:nvPr/>
-        </p:nvSpPr>
-        <p:spPr>
-          <a:xfrm>
-            <a:off x="2471056" y="5499323"/>
-            <a:ext cx="1240972" cy="1251857"/>
-          </a:xfrm>
-          <a:prstGeom prst="flowChartMultidocument">
-            <a:avLst/>
-          </a:prstGeom>
-        </p:spPr>
-        <p:style>
-          <a:lnRef idx="2">
-            <a:schemeClr val="accent1">
-              <a:shade val="50000"/>
-            </a:schemeClr>
-          </a:lnRef>
-          <a:fillRef idx="1">
-            <a:schemeClr val="accent1"/>
-          </a:fillRef>
-          <a:effectRef idx="0">
-            <a:schemeClr val="accent1"/>
-          </a:effectRef>
-          <a:fontRef idx="minor">
-            <a:schemeClr val="lt1"/>
-          </a:fontRef>
-        </p:style>
-        <p:txBody>
-          <a:bodyPr rtlCol="0" anchor="ctr"/>
-          <a:lstStyle/>
-          <a:p>
-            <a:pPr algn="ctr"/>
-            <a:r>
-              <a:rPr kumimoji="1" lang="ja-JP" altLang="en-US" dirty="0" smtClean="0"/>
-              <a:t>ローカルリポジトリ</a:t>
-            </a:r>
-            <a:endParaRPr kumimoji="1" lang="ja-JP" altLang="en-US" dirty="0"/>
-          </a:p>
-        </p:txBody>
-      </p:sp>
-      <p:cxnSp>
-        <p:nvCxnSpPr>
-          <p:cNvPr id="34" name="直線矢印コネクタ 33"/>
-          <p:cNvCxnSpPr/>
-          <p:nvPr/>
-        </p:nvCxnSpPr>
-        <p:spPr>
-          <a:xfrm flipV="1">
-            <a:off x="5419306" y="4631472"/>
-            <a:ext cx="1412766" cy="1080087"/>
-          </a:xfrm>
-          <a:prstGeom prst="straightConnector1">
-            <a:avLst/>
-          </a:prstGeom>
-          <a:ln>
-            <a:tailEnd type="triangle"/>
-          </a:ln>
-        </p:spPr>
-        <p:style>
-          <a:lnRef idx="1">
-            <a:schemeClr val="accent1"/>
-          </a:lnRef>
-          <a:fillRef idx="0">
-            <a:schemeClr val="accent1"/>
-          </a:fillRef>
-          <a:effectRef idx="0">
-            <a:schemeClr val="accent1"/>
-          </a:effectRef>
-          <a:fontRef idx="minor">
-            <a:schemeClr val="tx1"/>
-          </a:fontRef>
-        </p:style>
-      </p:cxnSp>
-      <p:cxnSp>
-        <p:nvCxnSpPr>
-          <p:cNvPr id="35" name="直線矢印コネクタ 34"/>
-          <p:cNvCxnSpPr/>
-          <p:nvPr/>
-        </p:nvCxnSpPr>
-        <p:spPr>
-          <a:xfrm flipV="1">
-            <a:off x="8953491" y="4688549"/>
-            <a:ext cx="591055" cy="696134"/>
-          </a:xfrm>
-          <a:prstGeom prst="straightConnector1">
-            <a:avLst/>
-          </a:prstGeom>
-          <a:ln>
-            <a:tailEnd type="triangle"/>
-          </a:ln>
-        </p:spPr>
-        <p:style>
-          <a:lnRef idx="1">
-            <a:schemeClr val="accent1"/>
-          </a:lnRef>
-          <a:fillRef idx="0">
-            <a:schemeClr val="accent1"/>
-          </a:fillRef>
-          <a:effectRef idx="0">
-            <a:schemeClr val="accent1"/>
-          </a:effectRef>
-          <a:fontRef idx="minor">
-            <a:schemeClr val="tx1"/>
-          </a:fontRef>
-        </p:style>
-      </p:cxnSp>
-      <p:cxnSp>
-        <p:nvCxnSpPr>
-          <p:cNvPr id="36" name="直線矢印コネクタ 35"/>
-          <p:cNvCxnSpPr/>
-          <p:nvPr/>
-        </p:nvCxnSpPr>
-        <p:spPr>
-          <a:xfrm flipV="1">
-            <a:off x="1781720" y="5093216"/>
-            <a:ext cx="2202461" cy="713991"/>
-          </a:xfrm>
-          <a:prstGeom prst="straightConnector1">
-            <a:avLst/>
-          </a:prstGeom>
-          <a:ln>
-            <a:tailEnd type="triangle"/>
-          </a:ln>
-        </p:spPr>
-        <p:style>
-          <a:lnRef idx="1">
-            <a:schemeClr val="accent1"/>
-          </a:lnRef>
-          <a:fillRef idx="0">
-            <a:schemeClr val="accent1"/>
-          </a:fillRef>
-          <a:effectRef idx="0">
-            <a:schemeClr val="accent1"/>
-          </a:effectRef>
-          <a:fontRef idx="minor">
-            <a:schemeClr val="tx1"/>
-          </a:fontRef>
-        </p:style>
-      </p:cxnSp>
+            <a:endParaRPr lang="ja-JP" altLang="en-US"/>
+          </a:p>
+        </p:txBody>
+      </p:sp>
     </p:spTree>
     <p:extLst>
       <p:ext uri="{BB962C8B-B14F-4D97-AF65-F5344CB8AC3E}">
-        <p14:creationId xmlns:p14="http://schemas.microsoft.com/office/powerpoint/2010/main" val="2455208540"/>
+        <p14:creationId xmlns:p14="http://schemas.microsoft.com/office/powerpoint/2010/main" val="2295600838"/>
       </p:ext>
     </p:extLst>
   </p:cSld>

</xml_diff>